<commit_message>
Ammended the RQ in the research question presentation file
</commit_message>
<xml_diff>
--- a/reseach_question_presentation_template.pptx
+++ b/reseach_question_presentation_template.pptx
@@ -1,26 +1,26 @@
 
 <file path=ppt/presentation.xml><?xml version="1.0" encoding="utf-8"?>
-<p:presentation xmlns:a="http://schemas.openxmlformats.org/drawingml/2006/main" xmlns:r="http://schemas.openxmlformats.org/officeDocument/2006/relationships" xmlns:p="http://schemas.openxmlformats.org/presentationml/2006/main" xmlns:m="http://schemas.openxmlformats.org/officeDocument/2006/math" xmlns:w="http://schemas.openxmlformats.org/wordprocessingml/2006/main" saveSubsetFonts="1">
+<p:presentation xmlns:a="http://schemas.openxmlformats.org/drawingml/2006/main" xmlns:r="http://schemas.openxmlformats.org/officeDocument/2006/relationships" xmlns:p="http://schemas.openxmlformats.org/presentationml/2006/main" saveSubsetFonts="1">
   <p:sldMasterIdLst>
     <p:sldMasterId id="2147483648" r:id="rId4"/>
   </p:sldMasterIdLst>
   <p:notesMasterIdLst>
-    <p:notesMasterId r:id="rId13"/>
+    <p:notesMasterId r:id="rId11"/>
   </p:notesMasterIdLst>
   <p:sldIdLst>
-    <p:sldId id="256" r:id="rId7"/>
-    <p:sldId id="257" r:id="rId8"/>
-    <p:sldId id="258" r:id="rId9"/>
-    <p:sldId id="259" r:id="rId10"/>
-    <p:sldId id="260" r:id="rId11"/>
-    <p:sldId id="261" r:id="rId12"/>
+    <p:sldId id="256" r:id="rId5"/>
+    <p:sldId id="257" r:id="rId6"/>
+    <p:sldId id="258" r:id="rId7"/>
+    <p:sldId id="259" r:id="rId8"/>
+    <p:sldId id="260" r:id="rId9"/>
+    <p:sldId id="261" r:id="rId10"/>
   </p:sldIdLst>
   <p:sldSz cx="12192000" cy="6858000"/>
   <p:notesSz cx="6858000" cy="9144000"/>
   <p:custDataLst>
+    <p:custData r:id="rId3"/>
+    <p:custData r:id="rId2"/>
     <p:custData r:id="rId1"/>
-    <p:custData r:id="rId2"/>
-    <p:custData r:id="rId3"/>
   </p:custDataLst>
   <p:defaultTextStyle>
     <a:defPPr>
@@ -117,12 +117,43 @@
       </a:defRPr>
     </a:lvl9pPr>
   </p:defaultTextStyle>
+  <p:extLst>
+    <p:ext uri="{EFAFB233-063F-42B5-8137-9DF3F51BA10A}">
+      <p15:sldGuideLst xmlns:p15="http://schemas.microsoft.com/office/powerpoint/2012/main">
+        <p15:guide id="1" orient="horz" pos="2160">
+          <p15:clr>
+            <a:srgbClr val="A4A3A4"/>
+          </p15:clr>
+        </p15:guide>
+        <p15:guide id="2" pos="3840">
+          <p15:clr>
+            <a:srgbClr val="A4A3A4"/>
+          </p15:clr>
+        </p15:guide>
+        <p15:guide id="3" orient="horz" pos="3249">
+          <p15:clr>
+            <a:srgbClr val="A4A3A4"/>
+          </p15:clr>
+        </p15:guide>
+        <p15:guide id="4" pos="7068">
+          <p15:clr>
+            <a:srgbClr val="A4A3A4"/>
+          </p15:clr>
+        </p15:guide>
+        <p15:guide id="5" orient="horz" pos="1380">
+          <p15:clr>
+            <a:srgbClr val="A4A3A4"/>
+          </p15:clr>
+        </p15:guide>
+      </p15:sldGuideLst>
+    </p:ext>
+  </p:extLst>
 </p:presentation>
 </file>
 
 <file path=ppt/notesMasters/notesMaster1.xml><?xml version="1.0" encoding="utf-8"?>
 <p:notesMaster xmlns:a="http://schemas.openxmlformats.org/drawingml/2006/main" xmlns:r="http://schemas.openxmlformats.org/officeDocument/2006/relationships" xmlns:p="http://schemas.openxmlformats.org/presentationml/2006/main">
-  <p:cSld name="">
+  <p:cSld>
     <p:bg>
       <p:bgRef idx="1001">
         <a:schemeClr val="bg1"/>
@@ -208,7 +239,7 @@
             </a:pPr>
             <a:fld id="{8E359C8A-39F6-4045-9163-4042C4C26B15}" type="datetimeFigureOut">
               <a:rPr lang="en-GB"/>
-              <a:t>07/11/2025</a:t>
+              <a:t>01/12/2025</a:t>
             </a:fld>
             <a:endParaRPr lang="en-GB"/>
           </a:p>
@@ -218,7 +249,7 @@
         <p:nvSpPr>
           <p:cNvPr id="608673359" name="Slide Image Placeholder 3"/>
           <p:cNvSpPr>
-            <a:spLocks noChangeAspect="1" noGrp="1" noRot="1"/>
+            <a:spLocks noGrp="1" noRot="1" noChangeAspect="1"/>
           </p:cNvSpPr>
           <p:nvPr>
             <p:ph type="sldImg" idx="2"/>
@@ -495,8 +526,8 @@
 </file>
 
 <file path=ppt/notesSlides/notesSlide1.xml><?xml version="1.0" encoding="utf-8"?>
-<p:notes xmlns:a="http://schemas.openxmlformats.org/drawingml/2006/main" xmlns:r="http://schemas.openxmlformats.org/officeDocument/2006/relationships" xmlns:p="http://schemas.openxmlformats.org/presentationml/2006/main" xmlns:m="http://schemas.openxmlformats.org/officeDocument/2006/math" xmlns:w="http://schemas.openxmlformats.org/wordprocessingml/2006/main">
-  <p:cSld name="">
+<p:notes xmlns:a="http://schemas.openxmlformats.org/drawingml/2006/main" xmlns:r="http://schemas.openxmlformats.org/officeDocument/2006/relationships" xmlns:p="http://schemas.openxmlformats.org/presentationml/2006/main">
+  <p:cSld>
     <p:spTree>
       <p:nvGrpSpPr>
         <p:cNvPr id="1" name=""/>
@@ -515,7 +546,7 @@
         <p:nvSpPr>
           <p:cNvPr id="869809634" name="Slide Image Placeholder 1"/>
           <p:cNvSpPr>
-            <a:spLocks noChangeAspect="1" noGrp="1" noRot="1"/>
+            <a:spLocks noGrp="1" noRot="1" noChangeAspect="1"/>
           </p:cNvSpPr>
           <p:nvPr>
             <p:ph type="sldImg"/>
@@ -565,7 +596,7 @@
             </a:pPr>
             <a:fld id="{FAC8827E-CDBC-E6FA-6E6A-5D539E4CD4C9}" type="slidenum">
               <a:rPr/>
-              <a:t/>
+              <a:t>1</a:t>
             </a:fld>
             <a:endParaRPr/>
           </a:p>
@@ -580,8 +611,8 @@
 </file>
 
 <file path=ppt/notesSlides/notesSlide2.xml><?xml version="1.0" encoding="utf-8"?>
-<p:notes xmlns:a="http://schemas.openxmlformats.org/drawingml/2006/main" xmlns:r="http://schemas.openxmlformats.org/officeDocument/2006/relationships" xmlns:p="http://schemas.openxmlformats.org/presentationml/2006/main" xmlns:m="http://schemas.openxmlformats.org/officeDocument/2006/math" xmlns:w="http://schemas.openxmlformats.org/wordprocessingml/2006/main">
-  <p:cSld name="">
+<p:notes xmlns:a="http://schemas.openxmlformats.org/drawingml/2006/main" xmlns:r="http://schemas.openxmlformats.org/officeDocument/2006/relationships" xmlns:p="http://schemas.openxmlformats.org/presentationml/2006/main">
+  <p:cSld>
     <p:spTree>
       <p:nvGrpSpPr>
         <p:cNvPr id="1" name=""/>
@@ -600,7 +631,7 @@
         <p:nvSpPr>
           <p:cNvPr id="844603553" name="Slide Image Placeholder 1"/>
           <p:cNvSpPr>
-            <a:spLocks noChangeAspect="1" noGrp="1" noRot="1"/>
+            <a:spLocks noGrp="1" noRot="1" noChangeAspect="1"/>
           </p:cNvSpPr>
           <p:nvPr>
             <p:ph type="sldImg"/>
@@ -650,7 +681,7 @@
             </a:pPr>
             <a:fld id="{188B2DA9-9B12-A205-E827-52919463250E}" type="slidenum">
               <a:rPr/>
-              <a:t/>
+              <a:t>2</a:t>
             </a:fld>
             <a:endParaRPr/>
           </a:p>
@@ -665,8 +696,8 @@
 </file>
 
 <file path=ppt/notesSlides/notesSlide3.xml><?xml version="1.0" encoding="utf-8"?>
-<p:notes xmlns:a="http://schemas.openxmlformats.org/drawingml/2006/main" xmlns:r="http://schemas.openxmlformats.org/officeDocument/2006/relationships" xmlns:p="http://schemas.openxmlformats.org/presentationml/2006/main" xmlns:m="http://schemas.openxmlformats.org/officeDocument/2006/math" xmlns:w="http://schemas.openxmlformats.org/wordprocessingml/2006/main">
-  <p:cSld name="">
+<p:notes xmlns:a="http://schemas.openxmlformats.org/drawingml/2006/main" xmlns:r="http://schemas.openxmlformats.org/officeDocument/2006/relationships" xmlns:p="http://schemas.openxmlformats.org/presentationml/2006/main">
+  <p:cSld>
     <p:spTree>
       <p:nvGrpSpPr>
         <p:cNvPr id="1" name=""/>
@@ -685,7 +716,7 @@
         <p:nvSpPr>
           <p:cNvPr id="1116560958" name="Slide Image Placeholder 1"/>
           <p:cNvSpPr>
-            <a:spLocks noChangeAspect="1" noGrp="1" noRot="1"/>
+            <a:spLocks noGrp="1" noRot="1" noChangeAspect="1"/>
           </p:cNvSpPr>
           <p:nvPr>
             <p:ph type="sldImg"/>
@@ -750,8 +781,8 @@
 </file>
 
 <file path=ppt/notesSlides/notesSlide4.xml><?xml version="1.0" encoding="utf-8"?>
-<p:notes xmlns:a="http://schemas.openxmlformats.org/drawingml/2006/main" xmlns:r="http://schemas.openxmlformats.org/officeDocument/2006/relationships" xmlns:p="http://schemas.openxmlformats.org/presentationml/2006/main" xmlns:m="http://schemas.openxmlformats.org/officeDocument/2006/math" xmlns:w="http://schemas.openxmlformats.org/wordprocessingml/2006/main">
-  <p:cSld name="">
+<p:notes xmlns:a="http://schemas.openxmlformats.org/drawingml/2006/main" xmlns:r="http://schemas.openxmlformats.org/officeDocument/2006/relationships" xmlns:p="http://schemas.openxmlformats.org/presentationml/2006/main">
+  <p:cSld>
     <p:spTree>
       <p:nvGrpSpPr>
         <p:cNvPr id="1" name=""/>
@@ -770,7 +801,7 @@
         <p:nvSpPr>
           <p:cNvPr id="1183313372" name="Slide Image Placeholder 1"/>
           <p:cNvSpPr>
-            <a:spLocks noChangeAspect="1" noGrp="1" noRot="1"/>
+            <a:spLocks noGrp="1" noRot="1" noChangeAspect="1"/>
           </p:cNvSpPr>
           <p:nvPr>
             <p:ph type="sldImg"/>
@@ -798,15 +829,7 @@
             </a:pPr>
             <a:r>
               <a:rPr lang="en-GB"/>
-              <a:t>Before specifying your Research Question you must define the type of data you are analysing.  Are the variables you select interval data (measurement data you can divide, multiple, etc),  OR are they ordinal (there is a definite order but the intervals between each variable are not necessarily equal, or the terms might be subjective like in a </a:t>
-            </a:r>
-            <a:r>
-              <a:rPr lang="en-GB"/>
-              <a:t>likert</a:t>
-            </a:r>
-            <a:r>
-              <a:rPr lang="en-GB"/>
-              <a:t> scale); OR are they just categorical/nominal (Items such as film names, cities, etc., that you can count numbers of occurrences?   You also need to understand whether the variable is either dependent or independent and this will vary according to the context. Independent variables may cause an effect, whereas the dependent variable might be effected by the independent variable.  Check the lecture notes on the RQ for more information and examples.  </a:t>
+              <a:t>Before specifying your Research Question you must define the type of data you are analysing.  Are the variables you select interval data (measurement data you can divide, multiple, etc),  OR are they ordinal (there is a definite order but the intervals between each variable are not necessarily equal, or the terms might be subjective like in a likert scale); OR are they just categorical/nominal (Items such as film names, cities, etc., that you can count numbers of occurrences?   You also need to understand whether the variable is either dependent or independent and this will vary according to the context. Independent variables may cause an effect, whereas the dependent variable might be effected by the independent variable.  Check the lecture notes on the RQ for more information and examples.  </a:t>
             </a:r>
             <a:endParaRPr/>
           </a:p>
@@ -863,8 +886,8 @@
 </file>
 
 <file path=ppt/notesSlides/notesSlide5.xml><?xml version="1.0" encoding="utf-8"?>
-<p:notes xmlns:a="http://schemas.openxmlformats.org/drawingml/2006/main" xmlns:r="http://schemas.openxmlformats.org/officeDocument/2006/relationships" xmlns:p="http://schemas.openxmlformats.org/presentationml/2006/main" xmlns:m="http://schemas.openxmlformats.org/officeDocument/2006/math" xmlns:w="http://schemas.openxmlformats.org/wordprocessingml/2006/main">
-  <p:cSld name="">
+<p:notes xmlns:a="http://schemas.openxmlformats.org/drawingml/2006/main" xmlns:r="http://schemas.openxmlformats.org/officeDocument/2006/relationships" xmlns:p="http://schemas.openxmlformats.org/presentationml/2006/main">
+  <p:cSld>
     <p:spTree>
       <p:nvGrpSpPr>
         <p:cNvPr id="1" name=""/>
@@ -883,7 +906,7 @@
         <p:nvSpPr>
           <p:cNvPr id="1955457230" name="Slide Image Placeholder 1"/>
           <p:cNvSpPr>
-            <a:spLocks noChangeAspect="1" noGrp="1" noRot="1"/>
+            <a:spLocks noGrp="1" noRot="1" noChangeAspect="1"/>
           </p:cNvSpPr>
           <p:nvPr>
             <p:ph type="sldImg"/>
@@ -948,8 +971,8 @@
 </file>
 
 <file path=ppt/notesSlides/notesSlide6.xml><?xml version="1.0" encoding="utf-8"?>
-<p:notes xmlns:a="http://schemas.openxmlformats.org/drawingml/2006/main" xmlns:r="http://schemas.openxmlformats.org/officeDocument/2006/relationships" xmlns:p="http://schemas.openxmlformats.org/presentationml/2006/main" xmlns:m="http://schemas.openxmlformats.org/officeDocument/2006/math" xmlns:w="http://schemas.openxmlformats.org/wordprocessingml/2006/main">
-  <p:cSld name="">
+<p:notes xmlns:a="http://schemas.openxmlformats.org/drawingml/2006/main" xmlns:r="http://schemas.openxmlformats.org/officeDocument/2006/relationships" xmlns:p="http://schemas.openxmlformats.org/presentationml/2006/main">
+  <p:cSld>
     <p:spTree>
       <p:nvGrpSpPr>
         <p:cNvPr id="1" name=""/>
@@ -968,7 +991,7 @@
         <p:nvSpPr>
           <p:cNvPr id="290349260" name="Slide Image Placeholder 1"/>
           <p:cNvSpPr>
-            <a:spLocks noChangeAspect="1" noGrp="1" noRot="1"/>
+            <a:spLocks noGrp="1" noRot="1" noChangeAspect="1"/>
           </p:cNvSpPr>
           <p:nvPr>
             <p:ph type="sldImg"/>
@@ -1033,16 +1056,17 @@
 </file>
 
 <file path=ppt/slideLayouts/slideLayout1.xml><?xml version="1.0" encoding="utf-8"?>
-<p:sldLayout xmlns:a="http://schemas.openxmlformats.org/drawingml/2006/main" xmlns:r="http://schemas.openxmlformats.org/officeDocument/2006/relationships" xmlns:p="http://schemas.openxmlformats.org/presentationml/2006/main" xmlns:m="http://schemas.openxmlformats.org/officeDocument/2006/math" xmlns:w="http://schemas.openxmlformats.org/wordprocessingml/2006/main" matchingName="" preserve="1" showMasterPhAnim="0" showMasterSp="1" userDrawn="1">
+<p:sldLayout xmlns:a="http://schemas.openxmlformats.org/drawingml/2006/main" xmlns:r="http://schemas.openxmlformats.org/officeDocument/2006/relationships" xmlns:p="http://schemas.openxmlformats.org/presentationml/2006/main" showMasterPhAnim="0" preserve="1" userDrawn="1">
   <p:cSld name="Cover">
     <p:bg>
-      <p:bgPr shadeToTitle="0">
+      <p:bgPr>
         <a:blipFill>
           <a:blip r:embed="rId2">
             <a:lum/>
           </a:blip>
           <a:stretch/>
         </a:blipFill>
+        <a:effectLst/>
       </p:bgPr>
     </p:bg>
     <p:spTree>
@@ -1090,13 +1114,14 @@
 </file>
 
 <file path=ppt/slideLayouts/slideLayout10.xml><?xml version="1.0" encoding="utf-8"?>
-<p:sldLayout xmlns:a="http://schemas.openxmlformats.org/drawingml/2006/main" xmlns:r="http://schemas.openxmlformats.org/officeDocument/2006/relationships" xmlns:p="http://schemas.openxmlformats.org/presentationml/2006/main" xmlns:m="http://schemas.openxmlformats.org/officeDocument/2006/math" xmlns:w="http://schemas.openxmlformats.org/wordprocessingml/2006/main" matchingName="" preserve="1" showMasterPhAnim="0" showMasterSp="1" userDrawn="1">
+<p:sldLayout xmlns:a="http://schemas.openxmlformats.org/drawingml/2006/main" xmlns:r="http://schemas.openxmlformats.org/officeDocument/2006/relationships" xmlns:p="http://schemas.openxmlformats.org/presentationml/2006/main" showMasterPhAnim="0" preserve="1" userDrawn="1">
   <p:cSld name="Full Bleed Image">
     <p:bg>
-      <p:bgPr shadeToTitle="0">
+      <p:bgPr>
         <a:solidFill>
           <a:schemeClr val="accent1"/>
         </a:solidFill>
+        <a:effectLst/>
       </p:bgPr>
     </p:bg>
     <p:spTree>
@@ -1161,13 +1186,14 @@
 </file>
 
 <file path=ppt/slideLayouts/slideLayout11.xml><?xml version="1.0" encoding="utf-8"?>
-<p:sldLayout xmlns:a="http://schemas.openxmlformats.org/drawingml/2006/main" xmlns:r="http://schemas.openxmlformats.org/officeDocument/2006/relationships" xmlns:p="http://schemas.openxmlformats.org/presentationml/2006/main" xmlns:m="http://schemas.openxmlformats.org/officeDocument/2006/math" xmlns:w="http://schemas.openxmlformats.org/wordprocessingml/2006/main" matchingName="" preserve="1" showMasterPhAnim="0" showMasterSp="1" userDrawn="1">
+<p:sldLayout xmlns:a="http://schemas.openxmlformats.org/drawingml/2006/main" xmlns:r="http://schemas.openxmlformats.org/officeDocument/2006/relationships" xmlns:p="http://schemas.openxmlformats.org/presentationml/2006/main" showMasterPhAnim="0" preserve="1" userDrawn="1">
   <p:cSld name="1_Video">
     <p:bg>
-      <p:bgPr shadeToTitle="0">
+      <p:bgPr>
         <a:solidFill>
           <a:schemeClr val="accent1"/>
         </a:solidFill>
+        <a:effectLst/>
       </p:bgPr>
     </p:bg>
     <p:spTree>
@@ -1226,13 +1252,14 @@
 </file>
 
 <file path=ppt/slideLayouts/slideLayout12.xml><?xml version="1.0" encoding="utf-8"?>
-<p:sldLayout xmlns:a="http://schemas.openxmlformats.org/drawingml/2006/main" xmlns:r="http://schemas.openxmlformats.org/officeDocument/2006/relationships" xmlns:p="http://schemas.openxmlformats.org/presentationml/2006/main" xmlns:m="http://schemas.openxmlformats.org/officeDocument/2006/math" xmlns:w="http://schemas.openxmlformats.org/wordprocessingml/2006/main" matchingName="" preserve="1" showMasterPhAnim="0" showMasterSp="0" userDrawn="1">
+<p:sldLayout xmlns:a="http://schemas.openxmlformats.org/drawingml/2006/main" xmlns:r="http://schemas.openxmlformats.org/officeDocument/2006/relationships" xmlns:p="http://schemas.openxmlformats.org/presentationml/2006/main" showMasterSp="0" showMasterPhAnim="0" preserve="1" userDrawn="1">
   <p:cSld name="Icons and text">
     <p:bg>
-      <p:bgPr shadeToTitle="0">
+      <p:bgPr>
         <a:solidFill>
           <a:schemeClr val="bg1"/>
         </a:solidFill>
+        <a:effectLst/>
       </p:bgPr>
     </p:bg>
     <p:spTree>
@@ -1661,13 +1688,14 @@
 </file>
 
 <file path=ppt/slideLayouts/slideLayout13.xml><?xml version="1.0" encoding="utf-8"?>
-<p:sldLayout xmlns:a="http://schemas.openxmlformats.org/drawingml/2006/main" xmlns:r="http://schemas.openxmlformats.org/officeDocument/2006/relationships" xmlns:p="http://schemas.openxmlformats.org/presentationml/2006/main" xmlns:m="http://schemas.openxmlformats.org/officeDocument/2006/math" xmlns:w="http://schemas.openxmlformats.org/wordprocessingml/2006/main" matchingName="" preserve="1" showMasterPhAnim="0" showMasterSp="1" userDrawn="1">
+<p:sldLayout xmlns:a="http://schemas.openxmlformats.org/drawingml/2006/main" xmlns:r="http://schemas.openxmlformats.org/officeDocument/2006/relationships" xmlns:p="http://schemas.openxmlformats.org/presentationml/2006/main" showMasterPhAnim="0" preserve="1" userDrawn="1">
   <p:cSld name="End page">
     <p:bg>
-      <p:bgPr shadeToTitle="0">
+      <p:bgPr>
         <a:solidFill>
           <a:schemeClr val="accent1"/>
         </a:solidFill>
+        <a:effectLst/>
       </p:bgPr>
     </p:bg>
     <p:spTree>
@@ -1848,13 +1876,14 @@
 </file>
 
 <file path=ppt/slideLayouts/slideLayout2.xml><?xml version="1.0" encoding="utf-8"?>
-<p:sldLayout xmlns:a="http://schemas.openxmlformats.org/drawingml/2006/main" xmlns:r="http://schemas.openxmlformats.org/officeDocument/2006/relationships" xmlns:p="http://schemas.openxmlformats.org/presentationml/2006/main" xmlns:m="http://schemas.openxmlformats.org/officeDocument/2006/math" xmlns:w="http://schemas.openxmlformats.org/wordprocessingml/2006/main" matchingName="" preserve="1" showMasterPhAnim="0" showMasterSp="1" type="title" userDrawn="1">
+<p:sldLayout xmlns:a="http://schemas.openxmlformats.org/drawingml/2006/main" xmlns:r="http://schemas.openxmlformats.org/officeDocument/2006/relationships" xmlns:p="http://schemas.openxmlformats.org/presentationml/2006/main" showMasterPhAnim="0" type="title" preserve="1" userDrawn="1">
   <p:cSld name="Section divider">
     <p:bg>
-      <p:bgPr shadeToTitle="0">
+      <p:bgPr>
         <a:solidFill>
           <a:schemeClr val="accent1"/>
         </a:solidFill>
+        <a:effectLst/>
       </p:bgPr>
     </p:bg>
     <p:spTree>
@@ -2106,13 +2135,14 @@
 </file>
 
 <file path=ppt/slideLayouts/slideLayout3.xml><?xml version="1.0" encoding="utf-8"?>
-<p:sldLayout xmlns:a="http://schemas.openxmlformats.org/drawingml/2006/main" xmlns:r="http://schemas.openxmlformats.org/officeDocument/2006/relationships" xmlns:p="http://schemas.openxmlformats.org/presentationml/2006/main" xmlns:m="http://schemas.openxmlformats.org/officeDocument/2006/math" xmlns:w="http://schemas.openxmlformats.org/wordprocessingml/2006/main" matchingName="" preserve="1" showMasterPhAnim="0" showMasterSp="1" userDrawn="1">
+<p:sldLayout xmlns:a="http://schemas.openxmlformats.org/drawingml/2006/main" xmlns:r="http://schemas.openxmlformats.org/officeDocument/2006/relationships" xmlns:p="http://schemas.openxmlformats.org/presentationml/2006/main" showMasterPhAnim="0" preserve="1" userDrawn="1">
   <p:cSld name="Title page">
     <p:bg>
-      <p:bgPr shadeToTitle="0">
+      <p:bgPr>
         <a:solidFill>
           <a:schemeClr val="bg1"/>
         </a:solidFill>
+        <a:effectLst/>
       </p:bgPr>
     </p:bg>
     <p:spTree>
@@ -2418,13 +2448,14 @@
 </file>
 
 <file path=ppt/slideLayouts/slideLayout4.xml><?xml version="1.0" encoding="utf-8"?>
-<p:sldLayout xmlns:a="http://schemas.openxmlformats.org/drawingml/2006/main" xmlns:r="http://schemas.openxmlformats.org/officeDocument/2006/relationships" xmlns:p="http://schemas.openxmlformats.org/presentationml/2006/main" xmlns:m="http://schemas.openxmlformats.org/officeDocument/2006/math" xmlns:w="http://schemas.openxmlformats.org/wordprocessingml/2006/main" matchingName="" preserve="1" showMasterPhAnim="0" showMasterSp="1" type="twoObj" userDrawn="1">
+<p:sldLayout xmlns:a="http://schemas.openxmlformats.org/drawingml/2006/main" xmlns:r="http://schemas.openxmlformats.org/officeDocument/2006/relationships" xmlns:p="http://schemas.openxmlformats.org/presentationml/2006/main" showMasterPhAnim="0" type="twoObj" preserve="1" userDrawn="1">
   <p:cSld name="Title and Two Content">
     <p:bg>
-      <p:bgPr shadeToTitle="0">
+      <p:bgPr>
         <a:solidFill>
           <a:schemeClr val="bg1"/>
         </a:solidFill>
+        <a:effectLst/>
       </p:bgPr>
     </p:bg>
     <p:spTree>
@@ -2720,13 +2751,14 @@
 </file>
 
 <file path=ppt/slideLayouts/slideLayout5.xml><?xml version="1.0" encoding="utf-8"?>
-<p:sldLayout xmlns:a="http://schemas.openxmlformats.org/drawingml/2006/main" xmlns:r="http://schemas.openxmlformats.org/officeDocument/2006/relationships" xmlns:p="http://schemas.openxmlformats.org/presentationml/2006/main" xmlns:m="http://schemas.openxmlformats.org/officeDocument/2006/math" xmlns:w="http://schemas.openxmlformats.org/wordprocessingml/2006/main" matchingName="" preserve="1" showMasterPhAnim="0" showMasterSp="1" type="obj" userDrawn="1">
+<p:sldLayout xmlns:a="http://schemas.openxmlformats.org/drawingml/2006/main" xmlns:r="http://schemas.openxmlformats.org/officeDocument/2006/relationships" xmlns:p="http://schemas.openxmlformats.org/presentationml/2006/main" showMasterPhAnim="0" type="obj" preserve="1" userDrawn="1">
   <p:cSld name="Title and Content">
     <p:bg>
-      <p:bgPr shadeToTitle="0">
+      <p:bgPr>
         <a:solidFill>
           <a:schemeClr val="bg1"/>
         </a:solidFill>
+        <a:effectLst/>
       </p:bgPr>
     </p:bg>
     <p:spTree>
@@ -2932,13 +2964,14 @@
 </file>
 
 <file path=ppt/slideLayouts/slideLayout6.xml><?xml version="1.0" encoding="utf-8"?>
-<p:sldLayout xmlns:a="http://schemas.openxmlformats.org/drawingml/2006/main" xmlns:r="http://schemas.openxmlformats.org/officeDocument/2006/relationships" xmlns:p="http://schemas.openxmlformats.org/presentationml/2006/main" xmlns:m="http://schemas.openxmlformats.org/officeDocument/2006/math" xmlns:w="http://schemas.openxmlformats.org/wordprocessingml/2006/main" matchingName="" preserve="1" showMasterPhAnim="0" showMasterSp="1" type="obj" userDrawn="1">
+<p:sldLayout xmlns:a="http://schemas.openxmlformats.org/drawingml/2006/main" xmlns:r="http://schemas.openxmlformats.org/officeDocument/2006/relationships" xmlns:p="http://schemas.openxmlformats.org/presentationml/2006/main" showMasterPhAnim="0" type="obj" preserve="1" userDrawn="1">
   <p:cSld name="Title and Content Large">
     <p:bg>
-      <p:bgPr shadeToTitle="0">
+      <p:bgPr>
         <a:solidFill>
           <a:schemeClr val="bg1"/>
         </a:solidFill>
+        <a:effectLst/>
       </p:bgPr>
     </p:bg>
     <p:spTree>
@@ -3123,13 +3156,14 @@
 </file>
 
 <file path=ppt/slideLayouts/slideLayout7.xml><?xml version="1.0" encoding="utf-8"?>
-<p:sldLayout xmlns:a="http://schemas.openxmlformats.org/drawingml/2006/main" xmlns:r="http://schemas.openxmlformats.org/officeDocument/2006/relationships" xmlns:p="http://schemas.openxmlformats.org/presentationml/2006/main" xmlns:m="http://schemas.openxmlformats.org/officeDocument/2006/math" xmlns:w="http://schemas.openxmlformats.org/wordprocessingml/2006/main" matchingName="" preserve="1" showMasterPhAnim="0" showMasterSp="1" userDrawn="1">
+<p:sldLayout xmlns:a="http://schemas.openxmlformats.org/drawingml/2006/main" xmlns:r="http://schemas.openxmlformats.org/officeDocument/2006/relationships" xmlns:p="http://schemas.openxmlformats.org/presentationml/2006/main" showMasterPhAnim="0" preserve="1" userDrawn="1">
   <p:cSld name="Title and Content Large blue">
     <p:bg>
-      <p:bgPr shadeToTitle="0">
+      <p:bgPr>
         <a:solidFill>
           <a:schemeClr val="accent1"/>
         </a:solidFill>
+        <a:effectLst/>
       </p:bgPr>
     </p:bg>
     <p:spTree>
@@ -3297,13 +3331,14 @@
 </file>
 
 <file path=ppt/slideLayouts/slideLayout8.xml><?xml version="1.0" encoding="utf-8"?>
-<p:sldLayout xmlns:a="http://schemas.openxmlformats.org/drawingml/2006/main" xmlns:r="http://schemas.openxmlformats.org/officeDocument/2006/relationships" xmlns:p="http://schemas.openxmlformats.org/presentationml/2006/main" xmlns:m="http://schemas.openxmlformats.org/officeDocument/2006/math" xmlns:w="http://schemas.openxmlformats.org/wordprocessingml/2006/main" matchingName="" preserve="1" showMasterPhAnim="0" showMasterSp="1" userDrawn="1">
+<p:sldLayout xmlns:a="http://schemas.openxmlformats.org/drawingml/2006/main" xmlns:r="http://schemas.openxmlformats.org/officeDocument/2006/relationships" xmlns:p="http://schemas.openxmlformats.org/presentationml/2006/main" showMasterPhAnim="0" preserve="1" userDrawn="1">
   <p:cSld name="Title + Image + Content">
     <p:bg>
-      <p:bgPr shadeToTitle="0">
+      <p:bgPr>
         <a:solidFill>
           <a:schemeClr val="bg1"/>
         </a:solidFill>
+        <a:effectLst/>
       </p:bgPr>
     </p:bg>
     <p:spTree>
@@ -3539,13 +3574,14 @@
 </file>
 
 <file path=ppt/slideLayouts/slideLayout9.xml><?xml version="1.0" encoding="utf-8"?>
-<p:sldLayout xmlns:a="http://schemas.openxmlformats.org/drawingml/2006/main" xmlns:r="http://schemas.openxmlformats.org/officeDocument/2006/relationships" xmlns:p="http://schemas.openxmlformats.org/presentationml/2006/main" xmlns:m="http://schemas.openxmlformats.org/officeDocument/2006/math" xmlns:w="http://schemas.openxmlformats.org/wordprocessingml/2006/main" matchingName="" preserve="1" showMasterPhAnim="0" showMasterSp="1" userDrawn="1">
+<p:sldLayout xmlns:a="http://schemas.openxmlformats.org/drawingml/2006/main" xmlns:r="http://schemas.openxmlformats.org/officeDocument/2006/relationships" xmlns:p="http://schemas.openxmlformats.org/presentationml/2006/main" showMasterPhAnim="0" preserve="1" userDrawn="1">
   <p:cSld name="Title + Content + 2 Images">
     <p:bg>
-      <p:bgPr shadeToTitle="0">
+      <p:bgPr>
         <a:solidFill>
           <a:schemeClr val="bg1"/>
         </a:solidFill>
+        <a:effectLst/>
       </p:bgPr>
     </p:bg>
     <p:spTree>
@@ -3868,8 +3904,8 @@
 </file>
 
 <file path=ppt/slideMasters/slideMaster1.xml><?xml version="1.0" encoding="utf-8"?>
-<p:sldMaster xmlns:a="http://schemas.openxmlformats.org/drawingml/2006/main" xmlns:r="http://schemas.openxmlformats.org/officeDocument/2006/relationships" xmlns:p="http://schemas.openxmlformats.org/presentationml/2006/main" xmlns:m="http://schemas.openxmlformats.org/officeDocument/2006/math" xmlns:w="http://schemas.openxmlformats.org/wordprocessingml/2006/main" preserve="0">
-  <p:cSld name="">
+<p:sldMaster xmlns:a="http://schemas.openxmlformats.org/drawingml/2006/main" xmlns:r="http://schemas.openxmlformats.org/officeDocument/2006/relationships" xmlns:p="http://schemas.openxmlformats.org/presentationml/2006/main">
+  <p:cSld>
     <p:bg>
       <p:bgRef idx="1001">
         <a:schemeClr val="bg1"/>
@@ -4111,7 +4147,7 @@
     <p:sldLayoutId id="2147483660" r:id="rId12"/>
     <p:sldLayoutId id="2147483661" r:id="rId13"/>
   </p:sldLayoutIdLst>
-  <p:hf dt="0" ftr="1" hdr="0" sldNum="1"/>
+  <p:hf hdr="0" dt="0"/>
   <p:txStyles>
     <p:titleStyle>
       <a:lvl1pPr algn="l" defTabSz="914400" rtl="0">
@@ -4405,8 +4441,8 @@
 </file>
 
 <file path=ppt/slides/slide1.xml><?xml version="1.0" encoding="utf-8"?>
-<p:sld xmlns:a="http://schemas.openxmlformats.org/drawingml/2006/main" xmlns:r="http://schemas.openxmlformats.org/officeDocument/2006/relationships" xmlns:p="http://schemas.openxmlformats.org/presentationml/2006/main" xmlns:m="http://schemas.openxmlformats.org/officeDocument/2006/math" xmlns:w="http://schemas.openxmlformats.org/wordprocessingml/2006/main" xmlns:mc="http://schemas.openxmlformats.org/markup-compatibility/2006" showMasterPhAnim="0" showMasterSp="1" show="1">
-  <p:cSld name="">
+<p:sld xmlns:a="http://schemas.openxmlformats.org/drawingml/2006/main" xmlns:r="http://schemas.openxmlformats.org/officeDocument/2006/relationships" xmlns:p="http://schemas.openxmlformats.org/presentationml/2006/main" showMasterPhAnim="0">
+  <p:cSld>
     <p:spTree>
       <p:nvGrpSpPr>
         <p:cNvPr id="1" name=""/>
@@ -4507,47 +4543,26 @@
             </a:pPr>
             <a:r>
               <a:rPr lang="en-GB"/>
-              <a:t>You have 5 minutes to present – be ready to share your screen, present slides in "full screen / presentation mode". Practice first. We can only offer you one opportunity to present your Research Question, so please </a:t>
-            </a:r>
-            <a:r>
-              <a:rPr lang="en-GB"/>
-              <a:t>make the most of this opportunity to help you pass coursework 2. </a:t>
-            </a:r>
+              <a:t>You have 5 minutes to present – be ready to share your screen, present slides in "full screen / presentation mode". Practice first. We can only offer you one opportunity to present your Research Question, so please make the most of this opportunity to help you pass coursework 2. </a:t>
+            </a:r>
+          </a:p>
+          <a:p>
+            <a:pPr>
+              <a:defRPr/>
+            </a:pPr>
             <a:endParaRPr lang="en-GB"/>
           </a:p>
           <a:p>
             <a:pPr>
               <a:defRPr/>
             </a:pPr>
-            <a:endParaRPr lang="en-GB"/>
-          </a:p>
-          <a:p>
-            <a:pPr>
-              <a:defRPr/>
-            </a:pPr>
             <a:r>
               <a:rPr lang="en-GB">
                 <a:solidFill>
                   <a:srgbClr val="FF0000"/>
                 </a:solidFill>
               </a:rPr>
-              <a:t>Research Questions are dependent on the variables and datatypes you have in your assigned dataset. Before you define your Research Question, your dataset dsXXXX must match your assigned Dataset, I.e., did you </a:t>
-            </a:r>
-            <a:r>
-              <a:rPr lang="en-GB">
-                <a:solidFill>
-                  <a:srgbClr val="FF0000"/>
-                </a:solidFill>
-              </a:rPr>
-              <a:t>receive confirmation email about your allocation?</a:t>
-            </a:r>
-            <a:r>
-              <a:rPr lang="en-GB">
-                <a:solidFill>
-                  <a:srgbClr val="FF0000"/>
-                </a:solidFill>
-              </a:rPr>
-              <a:t> Your group number must be assigned to the dataset you are referencing here.</a:t>
+              <a:t>Research Questions are dependent on the variables and datatypes you have in your assigned dataset. Before you define your Research Question, your dataset dsXXXX must match your assigned Dataset, I.e., did you receive confirmation email about your allocation? Your group number must be assigned to the dataset you are referencing here.</a:t>
             </a:r>
             <a:endParaRPr lang="en-GB">
               <a:solidFill>
@@ -4573,11 +4588,7 @@
             </a:pPr>
             <a:r>
               <a:rPr lang="en-GB"/>
-              <a:t>The next slides give you three alternatives for defining your research question and hypotheses. Select </a:t>
-            </a:r>
-            <a:r>
-              <a:rPr lang="en-GB"/>
-              <a:t>only </a:t>
+              <a:t>The next slides give you three alternatives for defining your research question and hypotheses. Select only </a:t>
             </a:r>
             <a:r>
               <a:rPr lang="en-GB" b="1"/>
@@ -4595,15 +4606,7 @@
             </a:pPr>
             <a:r>
               <a:rPr lang="en-GB"/>
-              <a:t>Before presenting DELETE all text that is either an instruction or an optionyou do not use (including this slide).   You can then enlarge your selection. Instructions for group sign up of presentation slots will be announced on Canvas and Slack. DO NOT SIGN UP unless you can attend. Ideally, all group members should attend; select one person to present, while others take notes. All group be ready to answer questions.  Any group not </a:t>
-            </a:r>
-            <a:r>
-              <a:rPr lang="en-GB"/>
-              <a:t>presenting will miss the opportunity to check a critical part of coursework 2.   Practice presenting on Teams </a:t>
-            </a:r>
-            <a:r>
-              <a:rPr lang="en-GB"/>
-              <a:t>first.</a:t>
+              <a:t>Before presenting DELETE all text that is either an instruction or an optionyou do not use (including this slide).   You can then enlarge your selection. Instructions for group sign up of presentation slots will be announced on Canvas and Slack. DO NOT SIGN UP unless you can attend. Ideally, all group members should attend; select one person to present, while others take notes. All group be ready to answer questions.  Any group not presenting will miss the opportunity to check a critical part of coursework 2.   Practice presenting on Teams first.</a:t>
             </a:r>
             <a:endParaRPr lang="en-GB">
               <a:cs typeface="Arial"/>
@@ -4630,28 +4633,21 @@
   <p:clrMapOvr>
     <a:masterClrMapping/>
   </p:clrMapOvr>
-  <mc:AlternateContent xmlns:mc="http://schemas.openxmlformats.org/markup-compatibility/2006">
-    <mc:Choice xmlns:p159="http://schemas.microsoft.com/office/powerpoint/2015/09/main" xmlns:p14="http://schemas.microsoft.com/office/powerpoint/2010/main" Requires="p159">
-      <p:transition p14:dur="2000" advClick="1"/>
-    </mc:Choice>
-    <mc:Fallback>
-      <p:transition advClick="1"/>
-    </mc:Fallback>
-  </mc:AlternateContent>
 </p:sld>
 </file>
 
 <file path=ppt/slides/slide2.xml><?xml version="1.0" encoding="utf-8"?>
-<p:sld xmlns:a="http://schemas.openxmlformats.org/drawingml/2006/main" xmlns:r="http://schemas.openxmlformats.org/officeDocument/2006/relationships" xmlns:p="http://schemas.openxmlformats.org/presentationml/2006/main" xmlns:m="http://schemas.openxmlformats.org/officeDocument/2006/math" xmlns:w="http://schemas.openxmlformats.org/wordprocessingml/2006/main" xmlns:mc="http://schemas.openxmlformats.org/markup-compatibility/2006" showMasterPhAnim="0" showMasterSp="1" show="1">
-  <p:cSld name="">
+<p:sld xmlns:a="http://schemas.openxmlformats.org/drawingml/2006/main" xmlns:r="http://schemas.openxmlformats.org/officeDocument/2006/relationships" xmlns:p="http://schemas.openxmlformats.org/presentationml/2006/main" showMasterPhAnim="0">
+  <p:cSld>
     <p:bg>
-      <p:bgPr shadeToTitle="0">
+      <p:bgPr>
         <a:blipFill>
           <a:blip r:embed="rId3">
             <a:lum/>
           </a:blip>
           <a:stretch/>
         </a:blipFill>
+        <a:effectLst/>
       </p:bgPr>
     </p:bg>
     <p:spTree>
@@ -4791,20 +4787,12 @@
   <p:clrMapOvr>
     <a:masterClrMapping/>
   </p:clrMapOvr>
-  <mc:AlternateContent xmlns:mc="http://schemas.openxmlformats.org/markup-compatibility/2006">
-    <mc:Choice xmlns:p159="http://schemas.microsoft.com/office/powerpoint/2015/09/main" xmlns:p14="http://schemas.microsoft.com/office/powerpoint/2010/main" Requires="p159">
-      <p:transition p14:dur="2000" advClick="1"/>
-    </mc:Choice>
-    <mc:Fallback>
-      <p:transition advClick="1"/>
-    </mc:Fallback>
-  </mc:AlternateContent>
 </p:sld>
 </file>
 
 <file path=ppt/slides/slide3.xml><?xml version="1.0" encoding="utf-8"?>
-<p:sld xmlns:a="http://schemas.openxmlformats.org/drawingml/2006/main" xmlns:r="http://schemas.openxmlformats.org/officeDocument/2006/relationships" xmlns:p="http://schemas.openxmlformats.org/presentationml/2006/main" xmlns:m="http://schemas.openxmlformats.org/officeDocument/2006/math" xmlns:w="http://schemas.openxmlformats.org/wordprocessingml/2006/main" xmlns:mc="http://schemas.openxmlformats.org/markup-compatibility/2006" showMasterPhAnim="0" showMasterSp="1" show="1">
-  <p:cSld name="">
+<p:sld xmlns:a="http://schemas.openxmlformats.org/drawingml/2006/main" xmlns:r="http://schemas.openxmlformats.org/officeDocument/2006/relationships" xmlns:p="http://schemas.openxmlformats.org/presentationml/2006/main" showMasterPhAnim="0">
+  <p:cSld>
     <p:spTree>
       <p:nvGrpSpPr>
         <p:cNvPr id="1" name=""/>
@@ -4933,13 +4921,13 @@
           </p:nvPr>
         </p:nvSpPr>
         <p:spPr bwMode="auto">
-          <a:xfrm flipH="0" flipV="0">
+          <a:xfrm>
             <a:off x="964883" y="1587499"/>
             <a:ext cx="9965844" cy="3152214"/>
           </a:xfrm>
         </p:spPr>
         <p:txBody>
-          <a:bodyPr vertOverflow="overflow" horzOverflow="overflow" vert="horz" wrap="square" lIns="0" tIns="0" rIns="0" bIns="0" numCol="1" spcCol="0" rtlCol="0" fromWordArt="0" anchor="t" anchorCtr="0" forceAA="0" upright="0" compatLnSpc="0">
+          <a:bodyPr vertOverflow="overflow" horzOverflow="overflow" vert="horz" wrap="square" lIns="0" tIns="0" rIns="0" bIns="0" numCol="1" spcCol="0" rtlCol="0" fromWordArt="0" anchor="t" anchorCtr="0" forceAA="0" compatLnSpc="0">
             <a:normAutofit fontScale="90000" lnSpcReduction="2000"/>
           </a:bodyPr>
           <a:lstStyle/>
@@ -5129,7 +5117,7 @@
       </p:sp>
       <p:pic>
         <p:nvPicPr>
-          <p:cNvPr id="679481036" name=""/>
+          <p:cNvPr id="679481036" name="Picture 679481035"/>
           <p:cNvPicPr>
             <a:picLocks noChangeAspect="1"/>
           </p:cNvPicPr>
@@ -5140,7 +5128,7 @@
           <a:stretch/>
         </p:blipFill>
         <p:spPr bwMode="auto">
-          <a:xfrm flipH="0" flipV="0">
+          <a:xfrm>
             <a:off x="1492249" y="3270249"/>
             <a:ext cx="9226663" cy="1269332"/>
           </a:xfrm>
@@ -5154,20 +5142,12 @@
   <p:clrMapOvr>
     <a:masterClrMapping/>
   </p:clrMapOvr>
-  <mc:AlternateContent xmlns:mc="http://schemas.openxmlformats.org/markup-compatibility/2006">
-    <mc:Choice xmlns:p159="http://schemas.microsoft.com/office/powerpoint/2015/09/main" xmlns:p14="http://schemas.microsoft.com/office/powerpoint/2010/main" Requires="p159">
-      <p:transition p14:dur="2000" advClick="1"/>
-    </mc:Choice>
-    <mc:Fallback>
-      <p:transition advClick="1"/>
-    </mc:Fallback>
-  </mc:AlternateContent>
 </p:sld>
 </file>
 
 <file path=ppt/slides/slide4.xml><?xml version="1.0" encoding="utf-8"?>
-<p:sld xmlns:a="http://schemas.openxmlformats.org/drawingml/2006/main" xmlns:r="http://schemas.openxmlformats.org/officeDocument/2006/relationships" xmlns:p="http://schemas.openxmlformats.org/presentationml/2006/main" xmlns:m="http://schemas.openxmlformats.org/officeDocument/2006/math" xmlns:w="http://schemas.openxmlformats.org/wordprocessingml/2006/main" xmlns:mc="http://schemas.openxmlformats.org/markup-compatibility/2006" showMasterPhAnim="0" showMasterSp="1" show="1">
-  <p:cSld name="">
+<p:sld xmlns:a="http://schemas.openxmlformats.org/drawingml/2006/main" xmlns:r="http://schemas.openxmlformats.org/officeDocument/2006/relationships" xmlns:p="http://schemas.openxmlformats.org/presentationml/2006/main" showMasterPhAnim="0">
+  <p:cSld>
     <p:spTree>
       <p:nvGrpSpPr>
         <p:cNvPr id="1" name=""/>
@@ -5525,20 +5505,12 @@
   <p:clrMapOvr>
     <a:masterClrMapping/>
   </p:clrMapOvr>
-  <mc:AlternateContent xmlns:mc="http://schemas.openxmlformats.org/markup-compatibility/2006">
-    <mc:Choice xmlns:p159="http://schemas.microsoft.com/office/powerpoint/2015/09/main" xmlns:p14="http://schemas.microsoft.com/office/powerpoint/2010/main" Requires="p159">
-      <p:transition p14:dur="2000" advClick="1"/>
-    </mc:Choice>
-    <mc:Fallback>
-      <p:transition advClick="1"/>
-    </mc:Fallback>
-  </mc:AlternateContent>
 </p:sld>
 </file>
 
 <file path=ppt/slides/slide5.xml><?xml version="1.0" encoding="utf-8"?>
-<p:sld xmlns:a="http://schemas.openxmlformats.org/drawingml/2006/main" xmlns:r="http://schemas.openxmlformats.org/officeDocument/2006/relationships" xmlns:p="http://schemas.openxmlformats.org/presentationml/2006/main" xmlns:m="http://schemas.openxmlformats.org/officeDocument/2006/math" xmlns:w="http://schemas.openxmlformats.org/wordprocessingml/2006/main" xmlns:mc="http://schemas.openxmlformats.org/markup-compatibility/2006" showMasterPhAnim="0" showMasterSp="1" show="1">
-  <p:cSld name="">
+<p:sld xmlns:a="http://schemas.openxmlformats.org/drawingml/2006/main" xmlns:r="http://schemas.openxmlformats.org/officeDocument/2006/relationships" xmlns:p="http://schemas.openxmlformats.org/presentationml/2006/main" showMasterPhAnim="0">
+  <p:cSld>
     <p:spTree>
       <p:nvGrpSpPr>
         <p:cNvPr id="1" name=""/>
@@ -5673,7 +5645,7 @@
               <a:defRPr/>
             </a:pPr>
             <a:r>
-              <a:rPr lang="en-IE" sz="2400" b="0">
+              <a:rPr lang="en-IE" sz="2400" b="0" dirty="0">
                 <a:latin typeface="Calibri"/>
                 <a:ea typeface="Calibri"/>
                 <a:cs typeface="Times New Roman"/>
@@ -5681,7 +5653,7 @@
               <a:t>Is there a correlation between </a:t>
             </a:r>
             <a:r>
-              <a:rPr lang="en-GB" sz="2400" b="0">
+              <a:rPr lang="en-GB" sz="2400" b="0" dirty="0">
                 <a:latin typeface="Calibri"/>
                 <a:ea typeface="Calibri"/>
                 <a:cs typeface="Times New Roman"/>
@@ -5689,7 +5661,7 @@
               <a:t>loan amount </a:t>
             </a:r>
             <a:r>
-              <a:rPr lang="en-IE" sz="2400" b="0">
+              <a:rPr lang="en-IE" sz="2400" b="0" dirty="0">
                 <a:latin typeface="Calibri"/>
                 <a:ea typeface="Calibri"/>
                 <a:cs typeface="Times New Roman"/>
@@ -5697,7 +5669,7 @@
               <a:t>and </a:t>
             </a:r>
             <a:r>
-              <a:rPr lang="en-GB" sz="2400" b="0">
+              <a:rPr lang="en-GB" sz="2400" b="0" dirty="0">
                 <a:solidFill>
                   <a:srgbClr val="0070C0"/>
                 </a:solidFill>
@@ -5705,10 +5677,10 @@
                 <a:ea typeface="Calibri"/>
                 <a:cs typeface="Times New Roman"/>
               </a:rPr>
-              <a:t>personal income for people</a:t>
-            </a:r>
-            <a:r>
-              <a:rPr lang="en-IE" sz="2400" b="0">
+              <a:t>personal income of applicants</a:t>
+            </a:r>
+            <a:r>
+              <a:rPr lang="en-IE" sz="2400" b="0" dirty="0">
                 <a:solidFill>
                   <a:srgbClr val="0070C0"/>
                 </a:solidFill>
@@ -5719,14 +5691,14 @@
               <a:t>?”</a:t>
             </a:r>
             <a:r>
-              <a:rPr lang="en-IE" sz="2400" b="0">
+              <a:rPr lang="en-IE" sz="2400" b="0" dirty="0">
                 <a:latin typeface="Calibri"/>
                 <a:ea typeface="Calibri"/>
                 <a:cs typeface="Times New Roman"/>
               </a:rPr>
               <a:t>. </a:t>
             </a:r>
-            <a:endParaRPr lang="en-GB" sz="2400">
+            <a:endParaRPr lang="en-GB" sz="2400" dirty="0">
               <a:solidFill>
                 <a:srgbClr val="FF0000"/>
               </a:solidFill>
@@ -5948,20 +5920,12 @@
   <p:clrMapOvr>
     <a:masterClrMapping/>
   </p:clrMapOvr>
-  <mc:AlternateContent xmlns:mc="http://schemas.openxmlformats.org/markup-compatibility/2006">
-    <mc:Choice xmlns:p159="http://schemas.microsoft.com/office/powerpoint/2015/09/main" xmlns:p14="http://schemas.microsoft.com/office/powerpoint/2010/main" Requires="p159">
-      <p:transition p14:dur="2000" advClick="1"/>
-    </mc:Choice>
-    <mc:Fallback>
-      <p:transition advClick="1"/>
-    </mc:Fallback>
-  </mc:AlternateContent>
 </p:sld>
 </file>
 
 <file path=ppt/slides/slide6.xml><?xml version="1.0" encoding="utf-8"?>
-<p:sld xmlns:a="http://schemas.openxmlformats.org/drawingml/2006/main" xmlns:r="http://schemas.openxmlformats.org/officeDocument/2006/relationships" xmlns:p="http://schemas.openxmlformats.org/presentationml/2006/main" xmlns:m="http://schemas.openxmlformats.org/officeDocument/2006/math" xmlns:w="http://schemas.openxmlformats.org/wordprocessingml/2006/main" xmlns:mc="http://schemas.openxmlformats.org/markup-compatibility/2006" showMasterPhAnim="0" showMasterSp="1" show="1">
-  <p:cSld name="">
+<p:sld xmlns:a="http://schemas.openxmlformats.org/drawingml/2006/main" xmlns:r="http://schemas.openxmlformats.org/officeDocument/2006/relationships" xmlns:p="http://schemas.openxmlformats.org/presentationml/2006/main" showMasterPhAnim="0">
+  <p:cSld>
     <p:spTree>
       <p:nvGrpSpPr>
         <p:cNvPr id="1" name=""/>
@@ -6030,14 +5994,7 @@
                 <a:latin typeface="Calibri"/>
                 <a:cs typeface="Calibri"/>
               </a:rPr>
-              <a:t>Your hypothesis wording comes directly from your </a:t>
-            </a:r>
-            <a:r>
-              <a:rPr lang="en-GB" sz="2400">
-                <a:latin typeface="Calibri"/>
-                <a:cs typeface="Calibri"/>
-              </a:rPr>
-              <a:t>RQ</a:t>
+              <a:t>Your hypothesis wording comes directly from your RQ</a:t>
             </a:r>
             <a:r>
               <a:rPr lang="en-GB" sz="2400" b="0">
@@ -6276,18 +6233,7 @@
                 <a:ea typeface="Arial"/>
                 <a:cs typeface="Arial"/>
               </a:rPr>
-              <a:t>loan amount and personal income </a:t>
-            </a:r>
-            <a:r>
-              <a:rPr lang="en-GB" sz="2000" b="0" i="0" u="none" strike="noStrike" cap="none" spc="-99">
-                <a:solidFill>
-                  <a:srgbClr val="FF0000"/>
-                </a:solidFill>
-                <a:latin typeface="Arial"/>
-                <a:ea typeface="Arial"/>
-                <a:cs typeface="Arial"/>
-              </a:rPr>
-              <a:t>of applicants</a:t>
+              <a:t>loan amount and personal income of applicants</a:t>
             </a:r>
             <a:r>
               <a:rPr lang="en-GB" sz="2000" b="0">
@@ -6422,19 +6368,11 @@
   <p:clrMapOvr>
     <a:masterClrMapping/>
   </p:clrMapOvr>
-  <mc:AlternateContent xmlns:mc="http://schemas.openxmlformats.org/markup-compatibility/2006">
-    <mc:Choice xmlns:p159="http://schemas.microsoft.com/office/powerpoint/2015/09/main" xmlns:p14="http://schemas.microsoft.com/office/powerpoint/2010/main" Requires="p159">
-      <p:transition p14:dur="2000" advClick="1"/>
-    </mc:Choice>
-    <mc:Fallback>
-      <p:transition advClick="1"/>
-    </mc:Fallback>
-  </mc:AlternateContent>
 </p:sld>
 </file>
 
 <file path=ppt/theme/theme1.xml><?xml version="1.0" encoding="utf-8"?>
-<a:theme xmlns:a="http://schemas.openxmlformats.org/drawingml/2006/main" xmlns:r="http://schemas.openxmlformats.org/officeDocument/2006/relationships" xmlns:p="http://schemas.openxmlformats.org/presentationml/2006/main" name="Herts Theme">
+<a:theme xmlns:a="http://schemas.openxmlformats.org/drawingml/2006/main" name="Herts Theme">
   <a:themeElements>
     <a:clrScheme name="Custom 2">
       <a:dk1>
@@ -6625,11 +6563,12 @@
     </a:fmtScheme>
   </a:themeElements>
   <a:objectDefaults/>
+  <a:extraClrSchemeLst/>
 </a:theme>
 </file>
 
 <file path=ppt/theme/theme2.xml><?xml version="1.0" encoding="utf-8"?>
-<a:theme xmlns:a="http://schemas.openxmlformats.org/drawingml/2006/main" xmlns:r="http://schemas.openxmlformats.org/officeDocument/2006/relationships" xmlns:p="http://schemas.openxmlformats.org/presentationml/2006/main" name="Office Theme">
+<a:theme xmlns:a="http://schemas.openxmlformats.org/drawingml/2006/main" name="Office Theme">
   <a:themeElements>
     <a:clrScheme name="Office">
       <a:dk1>
@@ -6820,6 +6759,7 @@
     </a:fmtScheme>
   </a:themeElements>
   <a:objectDefaults/>
+  <a:extraClrSchemeLst/>
 </a:theme>
 </file>
 
@@ -6832,15 +6772,6 @@
 </file>
 
 <file path=customXml/item2.xml><?xml version="1.0" encoding="utf-8"?>
-<?mso-contentType ?>
-<FormTemplates xmlns="http://schemas.microsoft.com/sharepoint/v3/contenttype/forms">
-  <Display>DocumentLibraryForm</Display>
-  <Edit>DocumentLibraryForm</Edit>
-  <New>DocumentLibraryForm</New>
-</FormTemplates>
-</file>
-
-<file path=customXml/item3.xml><?xml version="1.0" encoding="utf-8"?>
 <ct:contentTypeSchema xmlns:ct="http://schemas.microsoft.com/office/2006/metadata/contentType" xmlns:ma="http://schemas.microsoft.com/office/2006/metadata/properties/metaAttributes" ct:_="" ma:_="" ma:contentTypeName="Document" ma:contentTypeID="0x01010026DBA85F447B164191BB36C258697B67" ma:contentTypeVersion="14" ma:contentTypeDescription="Create a new document." ma:contentTypeScope="" ma:versionID="ea511d05ca7f895fe9556935b5c9af34">
   <xsd:schema xmlns:xsd="http://www.w3.org/2001/XMLSchema" xmlns:xs="http://www.w3.org/2001/XMLSchema" xmlns:p="http://schemas.microsoft.com/office/2006/metadata/properties" xmlns:ns2="4ad138b4-2b68-4b70-945d-07f8f18b1c9a" xmlns:ns3="3c474641-ec36-472f-b125-6b1b0910eaa4" targetNamespace="http://schemas.microsoft.com/office/2006/metadata/properties" ma:root="true" ma:fieldsID="662270106d7a7e100bcac2c5f8d29899" ns2:_="" ns3:_="">
     <xsd:import namespace="4ad138b4-2b68-4b70-945d-07f8f18b1c9a"/>
@@ -7063,6 +6994,15 @@
 </ct:contentTypeSchema>
 </file>
 
+<file path=customXml/item3.xml><?xml version="1.0" encoding="utf-8"?>
+<?mso-contentType ?>
+<FormTemplates xmlns="http://schemas.microsoft.com/sharepoint/v3/contenttype/forms">
+  <Display>DocumentLibraryForm</Display>
+  <Edit>DocumentLibraryForm</Edit>
+  <New>DocumentLibraryForm</New>
+</FormTemplates>
+</file>
+
 <file path=customXml/itemProps1.xml><?xml version="1.0" encoding="utf-8"?>
 <ds:datastoreItem xmlns:ds="http://schemas.openxmlformats.org/officeDocument/2006/customXml" ds:itemID="{EDD1FC41-23C7-41B0-B5F9-BF4CD38AD2ED}">
   <ds:schemaRefs>
@@ -7082,14 +7022,6 @@
 </file>
 
 <file path=customXml/itemProps2.xml><?xml version="1.0" encoding="utf-8"?>
-<ds:datastoreItem xmlns:ds="http://schemas.openxmlformats.org/officeDocument/2006/customXml" ds:itemID="{91C521DD-2673-4EE6-BB9B-DC5C3320FFBB}">
-  <ds:schemaRefs>
-    <ds:schemaRef ds:uri="http://schemas.microsoft.com/sharepoint/v3/contenttype/forms"/>
-  </ds:schemaRefs>
-</ds:datastoreItem>
-</file>
-
-<file path=customXml/itemProps3.xml><?xml version="1.0" encoding="utf-8"?>
 <ds:datastoreItem xmlns:ds="http://schemas.openxmlformats.org/officeDocument/2006/customXml" ds:itemID="{421B8C57-903D-4D0E-8336-7B512F760CD1}">
   <ds:schemaRefs>
     <ds:schemaRef ds:uri="3c474641-ec36-472f-b125-6b1b0910eaa4"/>
@@ -7107,4 +7039,12 @@
     <ds:schemaRef ds:uri="http://www.w3.org/2001/XMLSchema-instance"/>
   </ds:schemaRefs>
 </ds:datastoreItem>
+</file>
+
+<file path=customXml/itemProps3.xml><?xml version="1.0" encoding="utf-8"?>
+<ds:datastoreItem xmlns:ds="http://schemas.openxmlformats.org/officeDocument/2006/customXml" ds:itemID="{91C521DD-2673-4EE6-BB9B-DC5C3320FFBB}">
+  <ds:schemaRefs>
+    <ds:schemaRef ds:uri="http://schemas.microsoft.com/sharepoint/v3/contenttype/forms"/>
+  </ds:schemaRefs>
+</ds:datastoreItem>
 </file>
</xml_diff>

<commit_message>
modification to presentation files
</commit_message>
<xml_diff>
--- a/reseach_question_presentation_template.pptx
+++ b/reseach_question_presentation_template.pptx
@@ -5,7 +5,7 @@
     <p:sldMasterId id="2147483648" r:id="rId4"/>
   </p:sldMasterIdLst>
   <p:notesMasterIdLst>
-    <p:notesMasterId r:id="rId13"/>
+    <p:notesMasterId r:id="rId12"/>
   </p:notesMasterIdLst>
   <p:sldIdLst>
     <p:sldId id="256" r:id="rId7"/>
@@ -13,7 +13,6 @@
     <p:sldId id="258" r:id="rId9"/>
     <p:sldId id="259" r:id="rId10"/>
     <p:sldId id="260" r:id="rId11"/>
-    <p:sldId id="261" r:id="rId12"/>
   </p:sldIdLst>
   <p:sldSz cx="12192000" cy="6858000"/>
   <p:notesSz cx="6858000" cy="9144000"/>
@@ -144,7 +143,7 @@
       </p:grpSpPr>
       <p:sp>
         <p:nvSpPr>
-          <p:cNvPr id="806195396" name="Header Placeholder 1"/>
+          <p:cNvPr id="1976289717" name="Header Placeholder 1"/>
           <p:cNvSpPr>
             <a:spLocks noGrp="1"/>
           </p:cNvSpPr>
@@ -178,7 +177,7 @@
       </p:sp>
       <p:sp>
         <p:nvSpPr>
-          <p:cNvPr id="750667840" name="Date Placeholder 2"/>
+          <p:cNvPr id="1772140703" name="Date Placeholder 2"/>
           <p:cNvSpPr>
             <a:spLocks noGrp="1"/>
           </p:cNvSpPr>
@@ -216,7 +215,7 @@
       </p:sp>
       <p:sp>
         <p:nvSpPr>
-          <p:cNvPr id="608673359" name="Slide Image Placeholder 3"/>
+          <p:cNvPr id="1710120424" name="Slide Image Placeholder 3"/>
           <p:cNvSpPr>
             <a:spLocks noChangeAspect="1" noGrp="1" noRot="1"/>
           </p:cNvSpPr>
@@ -252,7 +251,7 @@
       </p:sp>
       <p:sp>
         <p:nvSpPr>
-          <p:cNvPr id="1553340548" name="Notes Placeholder 4"/>
+          <p:cNvPr id="1730613740" name="Notes Placeholder 4"/>
           <p:cNvSpPr>
             <a:spLocks noGrp="1"/>
           </p:cNvSpPr>
@@ -326,7 +325,7 @@
       </p:sp>
       <p:sp>
         <p:nvSpPr>
-          <p:cNvPr id="528571206" name="Footer Placeholder 5"/>
+          <p:cNvPr id="1890758996" name="Footer Placeholder 5"/>
           <p:cNvSpPr>
             <a:spLocks noGrp="1"/>
           </p:cNvSpPr>
@@ -360,7 +359,7 @@
       </p:sp>
       <p:sp>
         <p:nvSpPr>
-          <p:cNvPr id="402210514" name="Slide Number Placeholder 6"/>
+          <p:cNvPr id="1951147232" name="Slide Number Placeholder 6"/>
           <p:cNvSpPr>
             <a:spLocks noGrp="1"/>
           </p:cNvSpPr>
@@ -513,7 +512,7 @@
       </p:grpSpPr>
       <p:sp>
         <p:nvSpPr>
-          <p:cNvPr id="869809634" name="Slide Image Placeholder 1"/>
+          <p:cNvPr id="1139990061" name="Slide Image Placeholder 1"/>
           <p:cNvSpPr>
             <a:spLocks noChangeAspect="1" noGrp="1" noRot="1"/>
           </p:cNvSpPr>
@@ -525,7 +524,7 @@
       </p:sp>
       <p:sp>
         <p:nvSpPr>
-          <p:cNvPr id="1554022109" name="Notes Placeholder 2"/>
+          <p:cNvPr id="939449721" name="Notes Placeholder 2"/>
           <p:cNvSpPr>
             <a:spLocks noGrp="1"/>
           </p:cNvSpPr>
@@ -547,7 +546,7 @@
       </p:sp>
       <p:sp>
         <p:nvSpPr>
-          <p:cNvPr id="1694226680" name="Slide Number Placeholder 3"/>
+          <p:cNvPr id="676135828" name="Slide Number Placeholder 3"/>
           <p:cNvSpPr>
             <a:spLocks noGrp="1"/>
           </p:cNvSpPr>
@@ -563,7 +562,7 @@
             <a:pPr>
               <a:defRPr/>
             </a:pPr>
-            <a:fld id="{FAC8827E-CDBC-E6FA-6E6A-5D539E4CD4C9}" type="slidenum">
+            <a:fld id="{188B2DA9-9B12-A205-E827-52919463250E}" type="slidenum">
               <a:rPr/>
               <a:t/>
             </a:fld>
@@ -598,7 +597,7 @@
       </p:grpSpPr>
       <p:sp>
         <p:nvSpPr>
-          <p:cNvPr id="844603553" name="Slide Image Placeholder 1"/>
+          <p:cNvPr id="2080875831" name="Slide Image Placeholder 1"/>
           <p:cNvSpPr>
             <a:spLocks noChangeAspect="1" noGrp="1" noRot="1"/>
           </p:cNvSpPr>
@@ -610,7 +609,7 @@
       </p:sp>
       <p:sp>
         <p:nvSpPr>
-          <p:cNvPr id="332294807" name="Notes Placeholder 2"/>
+          <p:cNvPr id="7586459" name="Notes Placeholder 2"/>
           <p:cNvSpPr>
             <a:spLocks noGrp="1"/>
           </p:cNvSpPr>
@@ -626,18 +625,18 @@
             <a:pPr>
               <a:defRPr/>
             </a:pPr>
-            <a:endParaRPr/>
-          </a:p>
-        </p:txBody>
-      </p:sp>
-      <p:sp>
-        <p:nvSpPr>
-          <p:cNvPr id="1608209844" name="Slide Number Placeholder 3"/>
-          <p:cNvSpPr>
-            <a:spLocks noGrp="1"/>
-          </p:cNvSpPr>
-          <p:nvPr>
-            <p:ph type="sldNum" sz="quarter" idx="10"/>
+            <a:endParaRPr lang="en-GB"/>
+          </a:p>
+        </p:txBody>
+      </p:sp>
+      <p:sp>
+        <p:nvSpPr>
+          <p:cNvPr id="1257192823" name="Slide Number Placeholder 3"/>
+          <p:cNvSpPr>
+            <a:spLocks noGrp="1"/>
+          </p:cNvSpPr>
+          <p:nvPr>
+            <p:ph type="sldNum" sz="quarter" idx="5"/>
           </p:nvPr>
         </p:nvSpPr>
         <p:spPr bwMode="auto"/>
@@ -648,11 +647,11 @@
             <a:pPr>
               <a:defRPr/>
             </a:pPr>
-            <a:fld id="{188B2DA9-9B12-A205-E827-52919463250E}" type="slidenum">
-              <a:rPr/>
-              <a:t/>
+            <a:fld id="{30370952-48CC-46D7-9FCD-59FAD40CC025}" type="slidenum">
+              <a:rPr lang="en-GB"/>
+              <a:t>3</a:t>
             </a:fld>
-            <a:endParaRPr/>
+            <a:endParaRPr lang="en-GB"/>
           </a:p>
         </p:txBody>
       </p:sp>
@@ -683,7 +682,7 @@
       </p:grpSpPr>
       <p:sp>
         <p:nvSpPr>
-          <p:cNvPr id="1116560958" name="Slide Image Placeholder 1"/>
+          <p:cNvPr id="216264834" name="Slide Image Placeholder 1"/>
           <p:cNvSpPr>
             <a:spLocks noChangeAspect="1" noGrp="1" noRot="1"/>
           </p:cNvSpPr>
@@ -695,7 +694,7 @@
       </p:sp>
       <p:sp>
         <p:nvSpPr>
-          <p:cNvPr id="327737649" name="Notes Placeholder 2"/>
+          <p:cNvPr id="273943638" name="Notes Placeholder 2"/>
           <p:cNvSpPr>
             <a:spLocks noGrp="1"/>
           </p:cNvSpPr>
@@ -711,13 +710,41 @@
             <a:pPr>
               <a:defRPr/>
             </a:pPr>
+            <a:r>
+              <a:rPr lang="en-GB"/>
+              <a:t>Before specifying your Research Question you must define the type of data you are analysing.  Are the variables you select interval data (measurement data you can divide, multiple, etc),  OR are they ordinal (there is a definite order but the intervals between each variable are not necessarily equal, or the terms might be subjective like in a </a:t>
+            </a:r>
+            <a:r>
+              <a:rPr lang="en-GB"/>
+              <a:t>likert</a:t>
+            </a:r>
+            <a:r>
+              <a:rPr lang="en-GB"/>
+              <a:t> scale); OR are they just categorical/nominal (Items such as film names, cities, etc., that you can count numbers of occurrences?   You also need to understand whether the variable is either dependent or independent and this will vary according to the context. Independent variables may cause an effect, whereas the dependent variable might be effected by the independent variable.  Check the lecture notes on the RQ for more information and examples.  </a:t>
+            </a:r>
+            <a:endParaRPr/>
+          </a:p>
+          <a:p>
+            <a:pPr>
+              <a:defRPr/>
+            </a:pPr>
             <a:endParaRPr lang="en-GB"/>
           </a:p>
-        </p:txBody>
-      </p:sp>
-      <p:sp>
-        <p:nvSpPr>
-          <p:cNvPr id="363756817" name="Slide Number Placeholder 3"/>
+          <a:p>
+            <a:pPr>
+              <a:defRPr/>
+            </a:pPr>
+            <a:r>
+              <a:rPr lang="en-GB"/>
+              <a:t>You will get only one opportunity to present your Research Question ahead of the submission date.  Have your questions ready, and be ready to take notes on feedback.</a:t>
+            </a:r>
+            <a:endParaRPr/>
+          </a:p>
+        </p:txBody>
+      </p:sp>
+      <p:sp>
+        <p:nvSpPr>
+          <p:cNvPr id="258271376" name="Slide Number Placeholder 3"/>
           <p:cNvSpPr>
             <a:spLocks noGrp="1"/>
           </p:cNvSpPr>
@@ -735,7 +762,7 @@
             </a:pPr>
             <a:fld id="{30370952-48CC-46D7-9FCD-59FAD40CC025}" type="slidenum">
               <a:rPr lang="en-GB"/>
-              <a:t>3</a:t>
+              <a:t>4</a:t>
             </a:fld>
             <a:endParaRPr lang="en-GB"/>
           </a:p>
@@ -768,7 +795,7 @@
       </p:grpSpPr>
       <p:sp>
         <p:nvSpPr>
-          <p:cNvPr id="1183313372" name="Slide Image Placeholder 1"/>
+          <p:cNvPr id="121796143" name="Slide Image Placeholder 1"/>
           <p:cNvSpPr>
             <a:spLocks noChangeAspect="1" noGrp="1" noRot="1"/>
           </p:cNvSpPr>
@@ -780,7 +807,7 @@
       </p:sp>
       <p:sp>
         <p:nvSpPr>
-          <p:cNvPr id="608780270" name="Notes Placeholder 2"/>
+          <p:cNvPr id="1990855427" name="Notes Placeholder 2"/>
           <p:cNvSpPr>
             <a:spLocks noGrp="1"/>
           </p:cNvSpPr>
@@ -796,41 +823,13 @@
             <a:pPr>
               <a:defRPr/>
             </a:pPr>
-            <a:r>
-              <a:rPr lang="en-GB"/>
-              <a:t>Before specifying your Research Question you must define the type of data you are analysing.  Are the variables you select interval data (measurement data you can divide, multiple, etc),  OR are they ordinal (there is a definite order but the intervals between each variable are not necessarily equal, or the terms might be subjective like in a </a:t>
-            </a:r>
-            <a:r>
-              <a:rPr lang="en-GB"/>
-              <a:t>likert</a:t>
-            </a:r>
-            <a:r>
-              <a:rPr lang="en-GB"/>
-              <a:t> scale); OR are they just categorical/nominal (Items such as film names, cities, etc., that you can count numbers of occurrences?   You also need to understand whether the variable is either dependent or independent and this will vary according to the context. Independent variables may cause an effect, whereas the dependent variable might be effected by the independent variable.  Check the lecture notes on the RQ for more information and examples.  </a:t>
-            </a:r>
-            <a:endParaRPr/>
-          </a:p>
-          <a:p>
-            <a:pPr>
-              <a:defRPr/>
-            </a:pPr>
             <a:endParaRPr lang="en-GB"/>
           </a:p>
-          <a:p>
-            <a:pPr>
-              <a:defRPr/>
-            </a:pPr>
-            <a:r>
-              <a:rPr lang="en-GB"/>
-              <a:t>You will get only one opportunity to present your Research Question ahead of the submission date.  Have your questions ready, and be ready to take notes on feedback.</a:t>
-            </a:r>
-            <a:endParaRPr/>
-          </a:p>
-        </p:txBody>
-      </p:sp>
-      <p:sp>
-        <p:nvSpPr>
-          <p:cNvPr id="791503757" name="Slide Number Placeholder 3"/>
+        </p:txBody>
+      </p:sp>
+      <p:sp>
+        <p:nvSpPr>
+          <p:cNvPr id="1237659953" name="Slide Number Placeholder 3"/>
           <p:cNvSpPr>
             <a:spLocks noGrp="1"/>
           </p:cNvSpPr>
@@ -848,7 +847,7 @@
             </a:pPr>
             <a:fld id="{30370952-48CC-46D7-9FCD-59FAD40CC025}" type="slidenum">
               <a:rPr lang="en-GB"/>
-              <a:t>4</a:t>
+              <a:t>5</a:t>
             </a:fld>
             <a:endParaRPr lang="en-GB"/>
           </a:p>
@@ -881,7 +880,7 @@
       </p:grpSpPr>
       <p:sp>
         <p:nvSpPr>
-          <p:cNvPr id="1955457230" name="Slide Image Placeholder 1"/>
+          <p:cNvPr id="2079884215" name="Slide Image Placeholder 1"/>
           <p:cNvSpPr>
             <a:spLocks noChangeAspect="1" noGrp="1" noRot="1"/>
           </p:cNvSpPr>
@@ -893,7 +892,7 @@
       </p:sp>
       <p:sp>
         <p:nvSpPr>
-          <p:cNvPr id="289760864" name="Notes Placeholder 2"/>
+          <p:cNvPr id="1465900389" name="Notes Placeholder 2"/>
           <p:cNvSpPr>
             <a:spLocks noGrp="1"/>
           </p:cNvSpPr>
@@ -915,92 +914,7 @@
       </p:sp>
       <p:sp>
         <p:nvSpPr>
-          <p:cNvPr id="1552380769" name="Slide Number Placeholder 3"/>
-          <p:cNvSpPr>
-            <a:spLocks noGrp="1"/>
-          </p:cNvSpPr>
-          <p:nvPr>
-            <p:ph type="sldNum" sz="quarter" idx="5"/>
-          </p:nvPr>
-        </p:nvSpPr>
-        <p:spPr bwMode="auto"/>
-        <p:txBody>
-          <a:bodyPr/>
-          <a:lstStyle/>
-          <a:p>
-            <a:pPr>
-              <a:defRPr/>
-            </a:pPr>
-            <a:fld id="{30370952-48CC-46D7-9FCD-59FAD40CC025}" type="slidenum">
-              <a:rPr lang="en-GB"/>
-              <a:t>5</a:t>
-            </a:fld>
-            <a:endParaRPr lang="en-GB"/>
-          </a:p>
-        </p:txBody>
-      </p:sp>
-    </p:spTree>
-  </p:cSld>
-  <p:clrMapOvr>
-    <a:masterClrMapping/>
-  </p:clrMapOvr>
-</p:notes>
-</file>
-
-<file path=ppt/notesSlides/notesSlide6.xml><?xml version="1.0" encoding="utf-8"?>
-<p:notes xmlns:a="http://schemas.openxmlformats.org/drawingml/2006/main" xmlns:r="http://schemas.openxmlformats.org/officeDocument/2006/relationships" xmlns:p="http://schemas.openxmlformats.org/presentationml/2006/main" xmlns:m="http://schemas.openxmlformats.org/officeDocument/2006/math" xmlns:w="http://schemas.openxmlformats.org/wordprocessingml/2006/main">
-  <p:cSld name="">
-    <p:spTree>
-      <p:nvGrpSpPr>
-        <p:cNvPr id="1" name=""/>
-        <p:cNvGrpSpPr/>
-        <p:nvPr/>
-      </p:nvGrpSpPr>
-      <p:grpSpPr bwMode="auto">
-        <a:xfrm>
-          <a:off x="0" y="0"/>
-          <a:ext cx="0" cy="0"/>
-          <a:chOff x="0" y="0"/>
-          <a:chExt cx="0" cy="0"/>
-        </a:xfrm>
-      </p:grpSpPr>
-      <p:sp>
-        <p:nvSpPr>
-          <p:cNvPr id="290349260" name="Slide Image Placeholder 1"/>
-          <p:cNvSpPr>
-            <a:spLocks noChangeAspect="1" noGrp="1" noRot="1"/>
-          </p:cNvSpPr>
-          <p:nvPr>
-            <p:ph type="sldImg"/>
-          </p:nvPr>
-        </p:nvSpPr>
-        <p:spPr bwMode="auto"/>
-      </p:sp>
-      <p:sp>
-        <p:nvSpPr>
-          <p:cNvPr id="1249515045" name="Notes Placeholder 2"/>
-          <p:cNvSpPr>
-            <a:spLocks noGrp="1"/>
-          </p:cNvSpPr>
-          <p:nvPr>
-            <p:ph type="body" idx="1"/>
-          </p:nvPr>
-        </p:nvSpPr>
-        <p:spPr bwMode="auto"/>
-        <p:txBody>
-          <a:bodyPr/>
-          <a:lstStyle/>
-          <a:p>
-            <a:pPr>
-              <a:defRPr/>
-            </a:pPr>
-            <a:endParaRPr lang="en-GB"/>
-          </a:p>
-        </p:txBody>
-      </p:sp>
-      <p:sp>
-        <p:nvSpPr>
-          <p:cNvPr id="1365981303" name="Slide Number Placeholder 3"/>
+          <p:cNvPr id="2088110784" name="Slide Number Placeholder 3"/>
           <p:cNvSpPr>
             <a:spLocks noGrp="1"/>
           </p:cNvSpPr>
@@ -1061,7 +975,7 @@
       </p:grpSpPr>
       <p:pic>
         <p:nvPicPr>
-          <p:cNvPr id="826322864" name="Picture 3" descr="University of Hertfordshire logo"/>
+          <p:cNvPr id="1789049701" name="Picture 3" descr="University of Hertfordshire logo"/>
           <p:cNvPicPr>
             <a:picLocks noChangeAspect="1"/>
           </p:cNvPicPr>
@@ -1115,7 +1029,7 @@
       </p:grpSpPr>
       <p:sp>
         <p:nvSpPr>
-          <p:cNvPr id="1795041863" name="Picture Placeholder 2"/>
+          <p:cNvPr id="716360304" name="Picture Placeholder 2"/>
           <p:cNvSpPr>
             <a:spLocks noGrp="1"/>
           </p:cNvSpPr>
@@ -1186,7 +1100,7 @@
       </p:grpSpPr>
       <p:sp>
         <p:nvSpPr>
-          <p:cNvPr id="2030962692" name="Media Placeholder 8"/>
+          <p:cNvPr id="18797851" name="Media Placeholder 8"/>
           <p:cNvSpPr>
             <a:spLocks noGrp="1"/>
           </p:cNvSpPr>
@@ -1251,7 +1165,7 @@
       </p:grpSpPr>
       <p:sp>
         <p:nvSpPr>
-          <p:cNvPr id="525591162" name="Footer Placeholder 4"/>
+          <p:cNvPr id="468513881" name="Footer Placeholder 4"/>
           <p:cNvSpPr>
             <a:spLocks noGrp="1"/>
           </p:cNvSpPr>
@@ -1277,7 +1191,7 @@
       </p:sp>
       <p:sp>
         <p:nvSpPr>
-          <p:cNvPr id="654818643" name="Slide Number Placeholder 5"/>
+          <p:cNvPr id="1540484548" name="Slide Number Placeholder 5"/>
           <p:cNvSpPr>
             <a:spLocks noGrp="1"/>
           </p:cNvSpPr>
@@ -1303,7 +1217,7 @@
       </p:sp>
       <p:sp>
         <p:nvSpPr>
-          <p:cNvPr id="1412260745" name="Rectangle 6"/>
+          <p:cNvPr id="742942490" name="Rectangle 6"/>
           <p:cNvSpPr/>
           <p:nvPr userDrawn="1"/>
         </p:nvSpPr>
@@ -1351,7 +1265,7 @@
       </p:sp>
       <p:sp>
         <p:nvSpPr>
-          <p:cNvPr id="725576095" name="Content Placeholder 2"/>
+          <p:cNvPr id="18100871" name="Content Placeholder 2"/>
           <p:cNvSpPr>
             <a:spLocks noGrp="1"/>
           </p:cNvSpPr>
@@ -1405,7 +1319,7 @@
       </p:sp>
       <p:sp>
         <p:nvSpPr>
-          <p:cNvPr id="1450015468" name="Content Placeholder 2"/>
+          <p:cNvPr id="1530985389" name="Content Placeholder 2"/>
           <p:cNvSpPr>
             <a:spLocks noGrp="1"/>
           </p:cNvSpPr>
@@ -1489,7 +1403,7 @@
       </p:sp>
       <p:sp>
         <p:nvSpPr>
-          <p:cNvPr id="297993671" name="Content Placeholder 2"/>
+          <p:cNvPr id="443190490" name="Content Placeholder 2"/>
           <p:cNvSpPr>
             <a:spLocks noGrp="1"/>
           </p:cNvSpPr>
@@ -1573,7 +1487,7 @@
       </p:sp>
       <p:sp>
         <p:nvSpPr>
-          <p:cNvPr id="1456868417" name="Picture Placeholder 7"/>
+          <p:cNvPr id="210661199" name="Picture Placeholder 7"/>
           <p:cNvSpPr>
             <a:spLocks noGrp="1"/>
           </p:cNvSpPr>
@@ -1600,7 +1514,7 @@
       </p:sp>
       <p:sp>
         <p:nvSpPr>
-          <p:cNvPr id="1703053703" name="Picture Placeholder 7"/>
+          <p:cNvPr id="1422167108" name="Picture Placeholder 7"/>
           <p:cNvSpPr>
             <a:spLocks noGrp="1"/>
           </p:cNvSpPr>
@@ -1627,7 +1541,7 @@
       </p:sp>
       <p:sp>
         <p:nvSpPr>
-          <p:cNvPr id="1770573330" name="Picture Placeholder 7"/>
+          <p:cNvPr id="2111411619" name="Picture Placeholder 7"/>
           <p:cNvSpPr>
             <a:spLocks noGrp="1"/>
           </p:cNvSpPr>
@@ -1686,7 +1600,7 @@
       </p:grpSpPr>
       <p:pic>
         <p:nvPicPr>
-          <p:cNvPr id="767083438" name="Picture 6"/>
+          <p:cNvPr id="541711759" name="Picture 6"/>
           <p:cNvPicPr>
             <a:picLocks noChangeAspect="1"/>
           </p:cNvPicPr>
@@ -1708,7 +1622,7 @@
       </p:pic>
       <p:sp>
         <p:nvSpPr>
-          <p:cNvPr id="702441727" name="Title 1"/>
+          <p:cNvPr id="1069042975" name="Title 1"/>
           <p:cNvSpPr>
             <a:spLocks noGrp="1"/>
           </p:cNvSpPr>
@@ -1755,7 +1669,7 @@
       </p:sp>
       <p:sp>
         <p:nvSpPr>
-          <p:cNvPr id="2069294918" name="Footer Placeholder 4"/>
+          <p:cNvPr id="230782695" name="Footer Placeholder 4"/>
           <p:cNvSpPr>
             <a:spLocks noGrp="1"/>
           </p:cNvSpPr>
@@ -1800,7 +1714,7 @@
       </p:sp>
       <p:sp>
         <p:nvSpPr>
-          <p:cNvPr id="1780884752" name="Slide Number Placeholder 5"/>
+          <p:cNvPr id="590883985" name="Slide Number Placeholder 5"/>
           <p:cNvSpPr>
             <a:spLocks noGrp="1"/>
           </p:cNvSpPr>
@@ -1873,7 +1787,7 @@
       </p:grpSpPr>
       <p:sp>
         <p:nvSpPr>
-          <p:cNvPr id="1740072435" name="Title 1"/>
+          <p:cNvPr id="1322150998" name="Title 1"/>
           <p:cNvSpPr>
             <a:spLocks noGrp="1"/>
           </p:cNvSpPr>
@@ -1917,7 +1831,7 @@
       </p:sp>
       <p:sp>
         <p:nvSpPr>
-          <p:cNvPr id="1155263919" name="Subtitle 2"/>
+          <p:cNvPr id="1093820370" name="Subtitle 2"/>
           <p:cNvSpPr>
             <a:spLocks noGrp="1"/>
           </p:cNvSpPr>
@@ -1991,7 +1905,7 @@
       </p:sp>
       <p:sp>
         <p:nvSpPr>
-          <p:cNvPr id="663783919" name="Footer Placeholder 4"/>
+          <p:cNvPr id="422035579" name="Footer Placeholder 4"/>
           <p:cNvSpPr>
             <a:spLocks noGrp="1"/>
           </p:cNvSpPr>
@@ -2036,7 +1950,7 @@
       </p:sp>
       <p:sp>
         <p:nvSpPr>
-          <p:cNvPr id="1866656302" name="Slide Number Placeholder 5"/>
+          <p:cNvPr id="1734969415" name="Slide Number Placeholder 5"/>
           <p:cNvSpPr>
             <a:spLocks noGrp="1"/>
           </p:cNvSpPr>
@@ -2077,7 +1991,7 @@
       </p:sp>
       <p:pic>
         <p:nvPicPr>
-          <p:cNvPr id="655110147" name="Picture 7" descr="A picture containing drawing&#10;&#10;Description automatically generated"/>
+          <p:cNvPr id="1722207994" name="Picture 7" descr="A picture containing drawing&#10;&#10;Description automatically generated"/>
           <p:cNvPicPr>
             <a:picLocks noChangeAspect="1"/>
           </p:cNvPicPr>
@@ -2131,7 +2045,7 @@
       </p:grpSpPr>
       <p:sp>
         <p:nvSpPr>
-          <p:cNvPr id="200310300" name="Subtitle 2"/>
+          <p:cNvPr id="1762677024" name="Subtitle 2"/>
           <p:cNvSpPr>
             <a:spLocks noGrp="1"/>
           </p:cNvSpPr>
@@ -2205,7 +2119,7 @@
       </p:sp>
       <p:sp>
         <p:nvSpPr>
-          <p:cNvPr id="577476553" name="Footer Placeholder 4"/>
+          <p:cNvPr id="1535471712" name="Footer Placeholder 4"/>
           <p:cNvSpPr>
             <a:spLocks noGrp="1"/>
           </p:cNvSpPr>
@@ -2246,7 +2160,7 @@
       </p:sp>
       <p:sp>
         <p:nvSpPr>
-          <p:cNvPr id="1444960051" name="Slide Number Placeholder 5"/>
+          <p:cNvPr id="1795224508" name="Slide Number Placeholder 5"/>
           <p:cNvSpPr>
             <a:spLocks noGrp="1"/>
           </p:cNvSpPr>
@@ -2287,7 +2201,7 @@
       </p:sp>
       <p:sp>
         <p:nvSpPr>
-          <p:cNvPr id="1858167204" name="Title 1"/>
+          <p:cNvPr id="1656431756" name="Title 1"/>
           <p:cNvSpPr>
             <a:spLocks noGrp="1"/>
           </p:cNvSpPr>
@@ -2331,7 +2245,7 @@
       </p:sp>
       <p:sp>
         <p:nvSpPr>
-          <p:cNvPr id="1099480525" name="Rectangle 9"/>
+          <p:cNvPr id="175481155" name="Rectangle 9"/>
           <p:cNvSpPr/>
           <p:nvPr userDrawn="1"/>
         </p:nvSpPr>
@@ -2383,7 +2297,7 @@
       </p:sp>
       <p:pic>
         <p:nvPicPr>
-          <p:cNvPr id="707240348" name="Picture 10"/>
+          <p:cNvPr id="727152653" name="Picture 10"/>
           <p:cNvPicPr>
             <a:picLocks noChangeAspect="1"/>
           </p:cNvPicPr>
@@ -2443,7 +2357,7 @@
       </p:grpSpPr>
       <p:sp>
         <p:nvSpPr>
-          <p:cNvPr id="330505536" name="Title 1"/>
+          <p:cNvPr id="935532468" name="Title 1"/>
           <p:cNvSpPr>
             <a:spLocks noGrp="1"/>
           </p:cNvSpPr>
@@ -2469,7 +2383,7 @@
       </p:sp>
       <p:sp>
         <p:nvSpPr>
-          <p:cNvPr id="701818232" name="Content Placeholder 2"/>
+          <p:cNvPr id="1891808850" name="Content Placeholder 2"/>
           <p:cNvSpPr>
             <a:spLocks noGrp="1"/>
           </p:cNvSpPr>
@@ -2526,7 +2440,7 @@
       </p:sp>
       <p:sp>
         <p:nvSpPr>
-          <p:cNvPr id="2010893821" name="Content Placeholder 3"/>
+          <p:cNvPr id="236424916" name="Content Placeholder 3"/>
           <p:cNvSpPr>
             <a:spLocks noGrp="1"/>
           </p:cNvSpPr>
@@ -2609,7 +2523,7 @@
       </p:sp>
       <p:sp>
         <p:nvSpPr>
-          <p:cNvPr id="1187847833" name="Footer Placeholder 5"/>
+          <p:cNvPr id="631025791" name="Footer Placeholder 5"/>
           <p:cNvSpPr>
             <a:spLocks noGrp="1"/>
           </p:cNvSpPr>
@@ -2635,7 +2549,7 @@
       </p:sp>
       <p:sp>
         <p:nvSpPr>
-          <p:cNvPr id="78913828" name="Slide Number Placeholder 6"/>
+          <p:cNvPr id="564456473" name="Slide Number Placeholder 6"/>
           <p:cNvSpPr>
             <a:spLocks noGrp="1"/>
           </p:cNvSpPr>
@@ -2661,7 +2575,7 @@
       </p:sp>
       <p:sp>
         <p:nvSpPr>
-          <p:cNvPr id="1318375588" name="Rectangle 7"/>
+          <p:cNvPr id="1926674535" name="Rectangle 7"/>
           <p:cNvSpPr/>
           <p:nvPr userDrawn="1"/>
         </p:nvSpPr>
@@ -2745,7 +2659,7 @@
       </p:grpSpPr>
       <p:sp>
         <p:nvSpPr>
-          <p:cNvPr id="637269619" name="Title 1"/>
+          <p:cNvPr id="1254333161" name="Title 1"/>
           <p:cNvSpPr>
             <a:spLocks noGrp="1"/>
           </p:cNvSpPr>
@@ -2771,7 +2685,7 @@
       </p:sp>
       <p:sp>
         <p:nvSpPr>
-          <p:cNvPr id="1879584696" name="Content Placeholder 2"/>
+          <p:cNvPr id="1351395194" name="Content Placeholder 2"/>
           <p:cNvSpPr>
             <a:spLocks noGrp="1"/>
           </p:cNvSpPr>
@@ -2825,7 +2739,7 @@
       </p:sp>
       <p:sp>
         <p:nvSpPr>
-          <p:cNvPr id="1639797544" name="Footer Placeholder 4"/>
+          <p:cNvPr id="709947149" name="Footer Placeholder 4"/>
           <p:cNvSpPr>
             <a:spLocks noGrp="1"/>
           </p:cNvSpPr>
@@ -2851,7 +2765,7 @@
       </p:sp>
       <p:sp>
         <p:nvSpPr>
-          <p:cNvPr id="75662216" name="Slide Number Placeholder 5"/>
+          <p:cNvPr id="67124507" name="Slide Number Placeholder 5"/>
           <p:cNvSpPr>
             <a:spLocks noGrp="1"/>
           </p:cNvSpPr>
@@ -2877,7 +2791,7 @@
       </p:sp>
       <p:sp>
         <p:nvSpPr>
-          <p:cNvPr id="198423127" name="Rectangle 6"/>
+          <p:cNvPr id="91250494" name="Rectangle 6"/>
           <p:cNvSpPr/>
           <p:nvPr userDrawn="1"/>
         </p:nvSpPr>
@@ -2957,7 +2871,7 @@
       </p:grpSpPr>
       <p:sp>
         <p:nvSpPr>
-          <p:cNvPr id="465510609" name="Title 1"/>
+          <p:cNvPr id="1916507418" name="Title 1"/>
           <p:cNvSpPr>
             <a:spLocks noGrp="1"/>
           </p:cNvSpPr>
@@ -2988,7 +2902,7 @@
       </p:sp>
       <p:sp>
         <p:nvSpPr>
-          <p:cNvPr id="294223192" name="Content Placeholder 2"/>
+          <p:cNvPr id="1284720221" name="Content Placeholder 2"/>
           <p:cNvSpPr>
             <a:spLocks noGrp="1"/>
           </p:cNvSpPr>
@@ -3042,7 +2956,7 @@
       </p:sp>
       <p:sp>
         <p:nvSpPr>
-          <p:cNvPr id="1312604369" name="Slide Number Placeholder 5"/>
+          <p:cNvPr id="1006611073" name="Slide Number Placeholder 5"/>
           <p:cNvSpPr>
             <a:spLocks noGrp="1"/>
           </p:cNvSpPr>
@@ -3068,7 +2982,7 @@
       </p:sp>
       <p:sp>
         <p:nvSpPr>
-          <p:cNvPr id="1352126452" name="Rectangle 6"/>
+          <p:cNvPr id="957260583" name="Rectangle 6"/>
           <p:cNvSpPr/>
           <p:nvPr userDrawn="1"/>
         </p:nvSpPr>
@@ -3148,7 +3062,7 @@
       </p:grpSpPr>
       <p:sp>
         <p:nvSpPr>
-          <p:cNvPr id="1625624994" name="Slide Number Placeholder 5"/>
+          <p:cNvPr id="151036482" name="Slide Number Placeholder 5"/>
           <p:cNvSpPr>
             <a:spLocks noGrp="1"/>
           </p:cNvSpPr>
@@ -3182,7 +3096,7 @@
       </p:sp>
       <p:sp>
         <p:nvSpPr>
-          <p:cNvPr id="750038982" name="Content Placeholder 2"/>
+          <p:cNvPr id="1666388748" name="Content Placeholder 2"/>
           <p:cNvSpPr>
             <a:spLocks noGrp="1"/>
           </p:cNvSpPr>
@@ -3251,7 +3165,7 @@
       </p:sp>
       <p:sp>
         <p:nvSpPr>
-          <p:cNvPr id="1209711662" name="Title 1"/>
+          <p:cNvPr id="1204547564" name="Title 1"/>
           <p:cNvSpPr>
             <a:spLocks noGrp="1"/>
           </p:cNvSpPr>
@@ -3322,7 +3236,7 @@
       </p:grpSpPr>
       <p:sp>
         <p:nvSpPr>
-          <p:cNvPr id="603848485" name="Title 1"/>
+          <p:cNvPr id="724678850" name="Title 1"/>
           <p:cNvSpPr>
             <a:spLocks noGrp="1"/>
           </p:cNvSpPr>
@@ -3348,7 +3262,7 @@
       </p:sp>
       <p:sp>
         <p:nvSpPr>
-          <p:cNvPr id="1193391957" name="Content Placeholder 3"/>
+          <p:cNvPr id="1828563912" name="Content Placeholder 3"/>
           <p:cNvSpPr>
             <a:spLocks noGrp="1"/>
           </p:cNvSpPr>
@@ -3405,7 +3319,7 @@
       </p:sp>
       <p:sp>
         <p:nvSpPr>
-          <p:cNvPr id="1180593392" name="Footer Placeholder 5"/>
+          <p:cNvPr id="1197829861" name="Footer Placeholder 5"/>
           <p:cNvSpPr>
             <a:spLocks noGrp="1"/>
           </p:cNvSpPr>
@@ -3431,7 +3345,7 @@
       </p:sp>
       <p:sp>
         <p:nvSpPr>
-          <p:cNvPr id="79021042" name="Slide Number Placeholder 6"/>
+          <p:cNvPr id="180640927" name="Slide Number Placeholder 6"/>
           <p:cNvSpPr>
             <a:spLocks noGrp="1"/>
           </p:cNvSpPr>
@@ -3457,7 +3371,7 @@
       </p:sp>
       <p:sp>
         <p:nvSpPr>
-          <p:cNvPr id="473018360" name="Picture Placeholder 9"/>
+          <p:cNvPr id="1105294533" name="Picture Placeholder 9"/>
           <p:cNvSpPr>
             <a:spLocks noGrp="1"/>
           </p:cNvSpPr>
@@ -3484,7 +3398,7 @@
       </p:sp>
       <p:sp>
         <p:nvSpPr>
-          <p:cNvPr id="73860937" name="Rectangle 10"/>
+          <p:cNvPr id="266758887" name="Rectangle 10"/>
           <p:cNvSpPr/>
           <p:nvPr userDrawn="1"/>
         </p:nvSpPr>
@@ -3564,7 +3478,7 @@
       </p:grpSpPr>
       <p:sp>
         <p:nvSpPr>
-          <p:cNvPr id="1438488949" name="Title 1"/>
+          <p:cNvPr id="7272745" name="Title 1"/>
           <p:cNvSpPr>
             <a:spLocks noGrp="1"/>
           </p:cNvSpPr>
@@ -3590,7 +3504,7 @@
       </p:sp>
       <p:sp>
         <p:nvSpPr>
-          <p:cNvPr id="1458154146" name="Footer Placeholder 5"/>
+          <p:cNvPr id="580668334" name="Footer Placeholder 5"/>
           <p:cNvSpPr>
             <a:spLocks noGrp="1"/>
           </p:cNvSpPr>
@@ -3616,7 +3530,7 @@
       </p:sp>
       <p:sp>
         <p:nvSpPr>
-          <p:cNvPr id="289416431" name="Slide Number Placeholder 6"/>
+          <p:cNvPr id="514245853" name="Slide Number Placeholder 6"/>
           <p:cNvSpPr>
             <a:spLocks noGrp="1"/>
           </p:cNvSpPr>
@@ -3642,7 +3556,7 @@
       </p:sp>
       <p:sp>
         <p:nvSpPr>
-          <p:cNvPr id="487369525" name="Rectangle 7"/>
+          <p:cNvPr id="1769132719" name="Rectangle 7"/>
           <p:cNvSpPr/>
           <p:nvPr userDrawn="1"/>
         </p:nvSpPr>
@@ -3690,7 +3604,7 @@
       </p:sp>
       <p:sp>
         <p:nvSpPr>
-          <p:cNvPr id="1912598673" name="Content Placeholder 9"/>
+          <p:cNvPr id="266337102" name="Content Placeholder 9"/>
           <p:cNvSpPr>
             <a:spLocks noGrp="1"/>
           </p:cNvSpPr>
@@ -3747,7 +3661,7 @@
       </p:sp>
       <p:sp>
         <p:nvSpPr>
-          <p:cNvPr id="151049627" name="Content Placeholder 9"/>
+          <p:cNvPr id="367804434" name="Content Placeholder 9"/>
           <p:cNvSpPr>
             <a:spLocks noGrp="1"/>
           </p:cNvSpPr>
@@ -3804,7 +3718,7 @@
       </p:sp>
       <p:sp>
         <p:nvSpPr>
-          <p:cNvPr id="1385632456" name="Content Placeholder 9"/>
+          <p:cNvPr id="1407815692" name="Content Placeholder 9"/>
           <p:cNvSpPr>
             <a:spLocks noGrp="1"/>
           </p:cNvSpPr>
@@ -3891,7 +3805,7 @@
       </p:grpSpPr>
       <p:sp>
         <p:nvSpPr>
-          <p:cNvPr id="1484758592" name="Title Placeholder 1"/>
+          <p:cNvPr id="665594479" name="Title Placeholder 1"/>
           <p:cNvSpPr>
             <a:spLocks noGrp="1"/>
           </p:cNvSpPr>
@@ -3927,7 +3841,7 @@
       </p:sp>
       <p:sp>
         <p:nvSpPr>
-          <p:cNvPr id="1920098421" name="Text Placeholder 2"/>
+          <p:cNvPr id="559933304" name="Text Placeholder 2"/>
           <p:cNvSpPr>
             <a:spLocks noGrp="1"/>
           </p:cNvSpPr>
@@ -4003,7 +3917,7 @@
       </p:sp>
       <p:sp>
         <p:nvSpPr>
-          <p:cNvPr id="2146118102" name="Footer Placeholder 4"/>
+          <p:cNvPr id="462023361" name="Footer Placeholder 4"/>
           <p:cNvSpPr>
             <a:spLocks noGrp="1"/>
           </p:cNvSpPr>
@@ -4049,7 +3963,7 @@
       </p:sp>
       <p:sp>
         <p:nvSpPr>
-          <p:cNvPr id="337104873" name="Slide Number Placeholder 5"/>
+          <p:cNvPr id="1924336690" name="Slide Number Placeholder 5"/>
           <p:cNvSpPr>
             <a:spLocks noGrp="1"/>
           </p:cNvSpPr>
@@ -4407,243 +4321,6 @@
 <file path=ppt/slides/slide1.xml><?xml version="1.0" encoding="utf-8"?>
 <p:sld xmlns:a="http://schemas.openxmlformats.org/drawingml/2006/main" xmlns:r="http://schemas.openxmlformats.org/officeDocument/2006/relationships" xmlns:p="http://schemas.openxmlformats.org/presentationml/2006/main" xmlns:m="http://schemas.openxmlformats.org/officeDocument/2006/math" xmlns:w="http://schemas.openxmlformats.org/wordprocessingml/2006/main" xmlns:mc="http://schemas.openxmlformats.org/markup-compatibility/2006" showMasterPhAnim="0" showMasterSp="1" show="1">
   <p:cSld name="">
-    <p:spTree>
-      <p:nvGrpSpPr>
-        <p:cNvPr id="1" name=""/>
-        <p:cNvGrpSpPr/>
-        <p:nvPr/>
-      </p:nvGrpSpPr>
-      <p:grpSpPr bwMode="auto">
-        <a:xfrm>
-          <a:off x="0" y="0"/>
-          <a:ext cx="0" cy="0"/>
-          <a:chOff x="0" y="0"/>
-          <a:chExt cx="0" cy="0"/>
-        </a:xfrm>
-      </p:grpSpPr>
-      <p:sp>
-        <p:nvSpPr>
-          <p:cNvPr id="748090446" name="Subtitle 1"/>
-          <p:cNvSpPr>
-            <a:spLocks noGrp="1"/>
-          </p:cNvSpPr>
-          <p:nvPr>
-            <p:ph type="subTitle" idx="1"/>
-          </p:nvPr>
-        </p:nvSpPr>
-        <p:spPr bwMode="auto">
-          <a:xfrm>
-            <a:off x="952799" y="699736"/>
-            <a:ext cx="10273911" cy="533111"/>
-          </a:xfrm>
-        </p:spPr>
-        <p:txBody>
-          <a:bodyPr/>
-          <a:lstStyle/>
-          <a:p>
-            <a:pPr>
-              <a:defRPr/>
-            </a:pPr>
-            <a:r>
-              <a:rPr lang="en-GB"/>
-              <a:t>Instructions for the Research Question Demos</a:t>
-            </a:r>
-            <a:endParaRPr/>
-          </a:p>
-        </p:txBody>
-      </p:sp>
-      <p:sp>
-        <p:nvSpPr>
-          <p:cNvPr id="2144413158" name="Slide Number Placeholder 3"/>
-          <p:cNvSpPr>
-            <a:spLocks noGrp="1"/>
-          </p:cNvSpPr>
-          <p:nvPr>
-            <p:ph type="sldNum" sz="quarter" idx="12"/>
-          </p:nvPr>
-        </p:nvSpPr>
-        <p:spPr bwMode="auto"/>
-        <p:txBody>
-          <a:bodyPr/>
-          <a:lstStyle/>
-          <a:p>
-            <a:pPr>
-              <a:defRPr/>
-            </a:pPr>
-            <a:fld id="{E4D355CA-84B7-41B1-B164-8BB439CC7C6B}" type="slidenum">
-              <a:rPr lang="en-GB"/>
-              <a:t>1</a:t>
-            </a:fld>
-            <a:endParaRPr lang="en-GB"/>
-          </a:p>
-        </p:txBody>
-      </p:sp>
-      <p:sp>
-        <p:nvSpPr>
-          <p:cNvPr id="1213322451" name="TextBox 5"/>
-          <p:cNvSpPr txBox="1"/>
-          <p:nvPr/>
-        </p:nvSpPr>
-        <p:spPr bwMode="auto">
-          <a:xfrm>
-            <a:off x="388578" y="1310979"/>
-            <a:ext cx="11486747" cy="5355312"/>
-          </a:xfrm>
-          <a:prstGeom prst="rect">
-            <a:avLst/>
-          </a:prstGeom>
-          <a:solidFill>
-            <a:schemeClr val="bg1"/>
-          </a:solidFill>
-        </p:spPr>
-        <p:txBody>
-          <a:bodyPr wrap="square" lIns="91440" tIns="45720" rIns="91440" bIns="45720" rtlCol="0" anchor="t">
-            <a:spAutoFit/>
-          </a:bodyPr>
-          <a:lstStyle/>
-          <a:p>
-            <a:pPr>
-              <a:defRPr/>
-            </a:pPr>
-            <a:r>
-              <a:rPr lang="en-GB"/>
-              <a:t>You have 5 minutes to present – be ready to share your screen, present slides in "full screen / presentation mode". Practice first. We can only offer you one opportunity to present your Research Question, so please </a:t>
-            </a:r>
-            <a:r>
-              <a:rPr lang="en-GB"/>
-              <a:t>make the most of this opportunity to help you pass coursework 2. </a:t>
-            </a:r>
-            <a:endParaRPr lang="en-GB"/>
-          </a:p>
-          <a:p>
-            <a:pPr>
-              <a:defRPr/>
-            </a:pPr>
-            <a:endParaRPr lang="en-GB"/>
-          </a:p>
-          <a:p>
-            <a:pPr>
-              <a:defRPr/>
-            </a:pPr>
-            <a:r>
-              <a:rPr lang="en-GB">
-                <a:solidFill>
-                  <a:srgbClr val="FF0000"/>
-                </a:solidFill>
-              </a:rPr>
-              <a:t>Research Questions are dependent on the variables and datatypes you have in your assigned dataset. Before you define your Research Question, your dataset dsXXXX must match your assigned Dataset, I.e., did you </a:t>
-            </a:r>
-            <a:r>
-              <a:rPr lang="en-GB">
-                <a:solidFill>
-                  <a:srgbClr val="FF0000"/>
-                </a:solidFill>
-              </a:rPr>
-              <a:t>receive confirmation email about your allocation?</a:t>
-            </a:r>
-            <a:r>
-              <a:rPr lang="en-GB">
-                <a:solidFill>
-                  <a:srgbClr val="FF0000"/>
-                </a:solidFill>
-              </a:rPr>
-              <a:t> Your group number must be assigned to the dataset you are referencing here.</a:t>
-            </a:r>
-            <a:endParaRPr lang="en-GB">
-              <a:solidFill>
-                <a:srgbClr val="FF0000"/>
-              </a:solidFill>
-              <a:cs typeface="Arial"/>
-            </a:endParaRPr>
-          </a:p>
-          <a:p>
-            <a:pPr>
-              <a:defRPr/>
-            </a:pPr>
-            <a:endParaRPr lang="en-GB">
-              <a:solidFill>
-                <a:srgbClr val="203232"/>
-              </a:solidFill>
-              <a:cs typeface="Arial"/>
-            </a:endParaRPr>
-          </a:p>
-          <a:p>
-            <a:pPr>
-              <a:defRPr/>
-            </a:pPr>
-            <a:r>
-              <a:rPr lang="en-GB"/>
-              <a:t>The next slides give you three alternatives for defining your research question and hypotheses. Select </a:t>
-            </a:r>
-            <a:r>
-              <a:rPr lang="en-GB"/>
-              <a:t>only </a:t>
-            </a:r>
-            <a:r>
-              <a:rPr lang="en-GB" b="1"/>
-              <a:t>one type </a:t>
-            </a:r>
-            <a:r>
-              <a:rPr lang="en-GB"/>
-              <a:t>of research question. </a:t>
-            </a:r>
-            <a:endParaRPr/>
-          </a:p>
-          <a:p>
-            <a:pPr>
-              <a:defRPr/>
-            </a:pPr>
-            <a:r>
-              <a:rPr lang="en-GB"/>
-              <a:t>Before presenting DELETE all text that is either an instruction or an optionyou do not use (including this slide).   You can then enlarge your selection. Instructions for group sign up of presentation slots will be announced on Canvas and Slack. DO NOT SIGN UP unless you can attend. Ideally, all group members should attend; select one person to present, while others take notes. All group be ready to answer questions.  Any group not </a:t>
-            </a:r>
-            <a:r>
-              <a:rPr lang="en-GB"/>
-              <a:t>presenting will miss the opportunity to check a critical part of coursework 2.   Practice presenting on Teams </a:t>
-            </a:r>
-            <a:r>
-              <a:rPr lang="en-GB"/>
-              <a:t>first.</a:t>
-            </a:r>
-            <a:endParaRPr lang="en-GB">
-              <a:cs typeface="Arial"/>
-            </a:endParaRPr>
-          </a:p>
-          <a:p>
-            <a:pPr>
-              <a:defRPr/>
-            </a:pPr>
-            <a:r>
-              <a:rPr lang="en-GB" b="1" i="1"/>
-              <a:t>We look forward to giving you feedback.  You will not be graded on this presentation but if you do not attend and you booked a space you are preventing someone else presenting and are going against our module values</a:t>
-            </a:r>
-            <a:r>
-              <a:rPr lang="en-GB"/>
-              <a:t>.  This will be reflected in your peer evaluation.</a:t>
-            </a:r>
-            <a:endParaRPr/>
-          </a:p>
-        </p:txBody>
-      </p:sp>
-    </p:spTree>
-  </p:cSld>
-  <p:clrMapOvr>
-    <a:masterClrMapping/>
-  </p:clrMapOvr>
-  <mc:AlternateContent xmlns:mc="http://schemas.openxmlformats.org/markup-compatibility/2006">
-    <mc:Choice xmlns:p159="http://schemas.microsoft.com/office/powerpoint/2015/09/main" xmlns:p14="http://schemas.microsoft.com/office/powerpoint/2010/main" Requires="p159">
-      <p:transition p14:dur="2000" advClick="1"/>
-    </mc:Choice>
-    <mc:Fallback>
-      <p:transition advClick="1"/>
-    </mc:Fallback>
-  </mc:AlternateContent>
-</p:sld>
-</file>
-
-<file path=ppt/slides/slide2.xml><?xml version="1.0" encoding="utf-8"?>
-<p:sld xmlns:a="http://schemas.openxmlformats.org/drawingml/2006/main" xmlns:r="http://schemas.openxmlformats.org/officeDocument/2006/relationships" xmlns:p="http://schemas.openxmlformats.org/presentationml/2006/main" xmlns:m="http://schemas.openxmlformats.org/officeDocument/2006/math" xmlns:w="http://schemas.openxmlformats.org/wordprocessingml/2006/main" xmlns:mc="http://schemas.openxmlformats.org/markup-compatibility/2006" showMasterPhAnim="0" showMasterSp="1" show="1">
-  <p:cSld name="">
     <p:bg>
       <p:bgPr shadeToTitle="0">
         <a:blipFill>
@@ -4670,7 +4347,7 @@
       </p:grpSpPr>
       <p:sp>
         <p:nvSpPr>
-          <p:cNvPr id="1519898006" name="Title 1"/>
+          <p:cNvPr id="127691624" name="Title 1"/>
           <p:cNvSpPr>
             <a:spLocks noGrp="1"/>
           </p:cNvSpPr>
@@ -4719,7 +4396,7 @@
       </p:sp>
       <p:sp>
         <p:nvSpPr>
-          <p:cNvPr id="329108758" name="Subtitle 2"/>
+          <p:cNvPr id="1588358636" name="Subtitle 2"/>
           <p:cNvSpPr>
             <a:spLocks noGrp="1"/>
           </p:cNvSpPr>
@@ -4757,7 +4434,7 @@
       </p:sp>
       <p:sp>
         <p:nvSpPr>
-          <p:cNvPr id="1211646664" name="Footer Placeholder 3"/>
+          <p:cNvPr id="734160080" name="Footer Placeholder 3"/>
           <p:cNvSpPr>
             <a:spLocks noGrp="1"/>
           </p:cNvSpPr>
@@ -4767,8 +4444,8 @@
         </p:nvSpPr>
         <p:spPr bwMode="auto">
           <a:xfrm>
-            <a:off x="965289" y="274320"/>
-            <a:ext cx="10455567" cy="736245"/>
+            <a:off x="965288" y="274320"/>
+            <a:ext cx="10455566" cy="736245"/>
           </a:xfrm>
         </p:spPr>
         <p:txBody>
@@ -4780,9 +4457,106 @@
             </a:pPr>
             <a:r>
               <a:rPr lang="en-GB"/>
-              <a:t>7COM1079-2025  Student Group No:  A5                  Names of Student Attendees  (all group should attend to get feedback): </a:t>
-            </a:r>
-            <a:endParaRPr/>
+              <a:t>7COM1079-2025  Student Group No:A5                    Names of Student Attendees  (all group should attend to get feedback): </a:t>
+            </a:r>
+            <a:endParaRPr lang="en-GB"/>
+          </a:p>
+          <a:p>
+            <a:pPr>
+              <a:defRPr/>
+            </a:pPr>
+            <a:r>
+              <a:rPr lang="en-GB"/>
+              <a:t>					 </a:t>
+            </a:r>
+            <a:r>
+              <a:rPr lang="en-US" sz="1500" b="0" i="0" u="none" strike="noStrike" cap="none" spc="0">
+                <a:solidFill>
+                  <a:schemeClr val="bg1"/>
+                </a:solidFill>
+                <a:latin typeface="Arial"/>
+                <a:ea typeface="Arial"/>
+                <a:cs typeface="Arial"/>
+              </a:rPr>
+              <a:t>Allan Chumba</a:t>
+            </a:r>
+            <a:r>
+              <a:rPr lang="en-GB"/>
+              <a:t>, </a:t>
+            </a:r>
+            <a:r>
+              <a:rPr lang="en-GB" sz="1500" b="0" i="0" u="none" strike="noStrike" cap="none" spc="0">
+                <a:solidFill>
+                  <a:schemeClr val="bg1"/>
+                </a:solidFill>
+                <a:latin typeface="Arial"/>
+                <a:ea typeface="Arial"/>
+                <a:cs typeface="Arial"/>
+              </a:rPr>
+              <a:t>Isaac Kechem, </a:t>
+            </a:r>
+            <a:r>
+              <a:rPr lang="en-GB" sz="1500" b="0" i="0" u="none" strike="noStrike" cap="none" spc="0">
+                <a:solidFill>
+                  <a:schemeClr val="bg1"/>
+                </a:solidFill>
+                <a:latin typeface="Arial"/>
+                <a:ea typeface="Arial"/>
+                <a:cs typeface="Arial"/>
+              </a:rPr>
+              <a:t>James Boro Kabecha</a:t>
+            </a:r>
+            <a:r>
+              <a:rPr lang="en-GB" sz="1500" b="0" i="0" u="none" strike="noStrike" cap="none" spc="0">
+                <a:solidFill>
+                  <a:schemeClr val="bg1"/>
+                </a:solidFill>
+                <a:latin typeface="Arial"/>
+                <a:ea typeface="Arial"/>
+                <a:cs typeface="Arial"/>
+              </a:rPr>
+              <a:t>, </a:t>
+            </a:r>
+            <a:r>
+              <a:rPr lang="en-GB" sz="1500" b="0" i="0" u="none" strike="noStrike" cap="none" spc="0">
+                <a:solidFill>
+                  <a:schemeClr val="bg1"/>
+                </a:solidFill>
+                <a:latin typeface="Arial"/>
+                <a:ea typeface="Arial"/>
+                <a:cs typeface="Arial"/>
+              </a:rPr>
+              <a:t>John Gathogo</a:t>
+            </a:r>
+            <a:r>
+              <a:rPr lang="en-GB" sz="1500" b="0" i="0" u="none" strike="noStrike" cap="none" spc="0">
+                <a:solidFill>
+                  <a:schemeClr val="bg1"/>
+                </a:solidFill>
+                <a:latin typeface="Arial"/>
+                <a:ea typeface="Arial"/>
+                <a:cs typeface="Arial"/>
+              </a:rPr>
+              <a:t>, </a:t>
+            </a:r>
+            <a:r>
+              <a:rPr lang="en-GB" sz="1500" b="0" i="0" u="none" strike="noStrike" cap="none" spc="0">
+                <a:solidFill>
+                  <a:schemeClr val="bg1"/>
+                </a:solidFill>
+                <a:latin typeface="Arial"/>
+                <a:ea typeface="Arial"/>
+                <a:cs typeface="Arial"/>
+              </a:rPr>
+              <a:t>					Moses Musoga</a:t>
+            </a:r>
+            <a:endParaRPr lang="en-GB" sz="1500" b="0" i="0" u="none" strike="noStrike" cap="none" spc="0">
+              <a:solidFill>
+                <a:schemeClr val="bg1"/>
+              </a:solidFill>
+              <a:latin typeface="Arial"/>
+              <a:cs typeface="Arial"/>
+            </a:endParaRPr>
           </a:p>
         </p:txBody>
       </p:sp>
@@ -4802,7 +4576,7 @@
 </p:sld>
 </file>
 
-<file path=ppt/slides/slide3.xml><?xml version="1.0" encoding="utf-8"?>
+<file path=ppt/slides/slide2.xml><?xml version="1.0" encoding="utf-8"?>
 <p:sld xmlns:a="http://schemas.openxmlformats.org/drawingml/2006/main" xmlns:r="http://schemas.openxmlformats.org/officeDocument/2006/relationships" xmlns:p="http://schemas.openxmlformats.org/presentationml/2006/main" xmlns:m="http://schemas.openxmlformats.org/officeDocument/2006/math" xmlns:w="http://schemas.openxmlformats.org/wordprocessingml/2006/main" xmlns:mc="http://schemas.openxmlformats.org/markup-compatibility/2006" showMasterPhAnim="0" showMasterSp="1" show="1">
   <p:cSld name="">
     <p:spTree>
@@ -4821,7 +4595,7 @@
       </p:grpSpPr>
       <p:sp>
         <p:nvSpPr>
-          <p:cNvPr id="857473160" name="Subtitle 1"/>
+          <p:cNvPr id="362571556" name="Subtitle 1"/>
           <p:cNvSpPr>
             <a:spLocks noGrp="1"/>
           </p:cNvSpPr>
@@ -4867,7 +4641,7 @@
       </p:sp>
       <p:sp>
         <p:nvSpPr>
-          <p:cNvPr id="312082439" name="Footer Placeholder 2"/>
+          <p:cNvPr id="304836515" name="Footer Placeholder 2"/>
           <p:cNvSpPr>
             <a:spLocks noGrp="1"/>
           </p:cNvSpPr>
@@ -4893,7 +4667,7 @@
       </p:sp>
       <p:sp>
         <p:nvSpPr>
-          <p:cNvPr id="1082227144" name="Slide Number Placeholder 3"/>
+          <p:cNvPr id="410980303" name="Slide Number Placeholder 3"/>
           <p:cNvSpPr>
             <a:spLocks noGrp="1"/>
           </p:cNvSpPr>
@@ -4924,7 +4698,7 @@
       </p:sp>
       <p:sp>
         <p:nvSpPr>
-          <p:cNvPr id="2087696260" name="Title 7"/>
+          <p:cNvPr id="525615700" name="Title 7"/>
           <p:cNvSpPr>
             <a:spLocks noGrp="1"/>
           </p:cNvSpPr>
@@ -5129,7 +4903,7 @@
       </p:sp>
       <p:pic>
         <p:nvPicPr>
-          <p:cNvPr id="679481036" name=""/>
+          <p:cNvPr id="434428916" name=""/>
           <p:cNvPicPr>
             <a:picLocks noChangeAspect="1"/>
           </p:cNvPicPr>
@@ -5165,6 +4939,361 @@
 </p:sld>
 </file>
 
+<file path=ppt/slides/slide3.xml><?xml version="1.0" encoding="utf-8"?>
+<p:sld xmlns:a="http://schemas.openxmlformats.org/drawingml/2006/main" xmlns:r="http://schemas.openxmlformats.org/officeDocument/2006/relationships" xmlns:p="http://schemas.openxmlformats.org/presentationml/2006/main" xmlns:m="http://schemas.openxmlformats.org/officeDocument/2006/math" xmlns:w="http://schemas.openxmlformats.org/wordprocessingml/2006/main" xmlns:mc="http://schemas.openxmlformats.org/markup-compatibility/2006" showMasterPhAnim="0" showMasterSp="1" show="1">
+  <p:cSld name="">
+    <p:spTree>
+      <p:nvGrpSpPr>
+        <p:cNvPr id="1" name=""/>
+        <p:cNvGrpSpPr/>
+        <p:nvPr/>
+      </p:nvGrpSpPr>
+      <p:grpSpPr bwMode="auto">
+        <a:xfrm>
+          <a:off x="0" y="0"/>
+          <a:ext cx="0" cy="0"/>
+          <a:chOff x="0" y="0"/>
+          <a:chExt cx="0" cy="0"/>
+        </a:xfrm>
+      </p:grpSpPr>
+      <p:sp>
+        <p:nvSpPr>
+          <p:cNvPr id="575426677" name="Subtitle 1"/>
+          <p:cNvSpPr>
+            <a:spLocks noGrp="1"/>
+          </p:cNvSpPr>
+          <p:nvPr>
+            <p:ph type="subTitle" idx="1"/>
+          </p:nvPr>
+        </p:nvSpPr>
+        <p:spPr bwMode="auto">
+          <a:xfrm>
+            <a:off x="965288" y="1285092"/>
+            <a:ext cx="10110240" cy="588024"/>
+          </a:xfrm>
+        </p:spPr>
+        <p:txBody>
+          <a:bodyPr vert="horz" lIns="0" tIns="0" rIns="0" bIns="0" rtlCol="0" anchor="t">
+            <a:noAutofit/>
+          </a:bodyPr>
+          <a:lstStyle/>
+          <a:p>
+            <a:pPr>
+              <a:defRPr/>
+            </a:pPr>
+            <a:r>
+              <a:rPr lang="en-US"/>
+              <a:t>Dataset </a:t>
+            </a:r>
+            <a:r>
+              <a:rPr lang="en-US">
+                <a:solidFill>
+                  <a:srgbClr val="203232"/>
+                </a:solidFill>
+              </a:rPr>
+              <a:t>ID</a:t>
+            </a:r>
+            <a:r>
+              <a:rPr lang="en-US" sz="1600">
+                <a:solidFill>
+                  <a:srgbClr val="FF0000"/>
+                </a:solidFill>
+              </a:rPr>
+              <a:t>:   </a:t>
+            </a:r>
+            <a:r>
+              <a:rPr lang="en-GB" sz="1600">
+                <a:solidFill>
+                  <a:srgbClr val="FF0000"/>
+                </a:solidFill>
+              </a:rPr>
+              <a:t>DS256- loan_Data.csv</a:t>
+            </a:r>
+            <a:endParaRPr/>
+          </a:p>
+        </p:txBody>
+      </p:sp>
+      <p:sp>
+        <p:nvSpPr>
+          <p:cNvPr id="1781622262" name="Footer Placeholder 2"/>
+          <p:cNvSpPr>
+            <a:spLocks noGrp="1"/>
+          </p:cNvSpPr>
+          <p:nvPr>
+            <p:ph type="ftr" sz="quarter" idx="11"/>
+          </p:nvPr>
+        </p:nvSpPr>
+        <p:spPr bwMode="auto">
+          <a:xfrm>
+            <a:off x="965288" y="791022"/>
+            <a:ext cx="9129687" cy="230832"/>
+          </a:xfrm>
+        </p:spPr>
+        <p:txBody>
+          <a:bodyPr/>
+          <a:lstStyle/>
+          <a:p>
+            <a:pPr>
+              <a:defRPr/>
+            </a:pPr>
+            <a:r>
+              <a:rPr lang="en-GB"/>
+              <a:t>7COM1079-2025  Student Group No:                    Names of Student Group Attendees: </a:t>
+            </a:r>
+            <a:endParaRPr/>
+          </a:p>
+        </p:txBody>
+      </p:sp>
+      <p:sp>
+        <p:nvSpPr>
+          <p:cNvPr id="1532316793" name="Slide Number Placeholder 3"/>
+          <p:cNvSpPr>
+            <a:spLocks noGrp="1"/>
+          </p:cNvSpPr>
+          <p:nvPr>
+            <p:ph type="sldNum" sz="quarter" idx="12"/>
+          </p:nvPr>
+        </p:nvSpPr>
+        <p:spPr bwMode="auto">
+          <a:xfrm>
+            <a:off x="10954511" y="555565"/>
+            <a:ext cx="622800" cy="230832"/>
+          </a:xfrm>
+        </p:spPr>
+        <p:txBody>
+          <a:bodyPr/>
+          <a:lstStyle/>
+          <a:p>
+            <a:pPr>
+              <a:defRPr/>
+            </a:pPr>
+            <a:r>
+              <a:rPr lang="en-US"/>
+              <a:t>2</a:t>
+            </a:r>
+            <a:endParaRPr lang="en-GB"/>
+          </a:p>
+        </p:txBody>
+      </p:sp>
+      <p:sp>
+        <p:nvSpPr>
+          <p:cNvPr id="1881443497" name="Title 4"/>
+          <p:cNvSpPr>
+            <a:spLocks noGrp="1"/>
+          </p:cNvSpPr>
+          <p:nvPr>
+            <p:ph type="ctrTitle"/>
+          </p:nvPr>
+        </p:nvSpPr>
+        <p:spPr bwMode="auto">
+          <a:xfrm>
+            <a:off x="724148" y="1987671"/>
+            <a:ext cx="10974945" cy="2699181"/>
+          </a:xfrm>
+        </p:spPr>
+        <p:txBody>
+          <a:bodyPr>
+            <a:noAutofit/>
+          </a:bodyPr>
+          <a:lstStyle/>
+          <a:p>
+            <a:pPr>
+              <a:lnSpc>
+                <a:spcPct val="100000"/>
+              </a:lnSpc>
+              <a:defRPr/>
+            </a:pPr>
+            <a:r>
+              <a:rPr lang="en-US" sz="2400" b="0">
+                <a:latin typeface="Calibri"/>
+                <a:cs typeface="Calibri"/>
+              </a:rPr>
+              <a:t>This dataset is interesting to us because </a:t>
+            </a:r>
+            <a:r>
+              <a:rPr lang="en-US" sz="2400" b="0">
+                <a:solidFill>
+                  <a:srgbClr val="FF0000"/>
+                </a:solidFill>
+                <a:latin typeface="Calibri"/>
+                <a:cs typeface="Calibri"/>
+              </a:rPr>
+              <a:t>(one sentence):</a:t>
+            </a:r>
+            <a:r>
+              <a:rPr lang="en-GB" sz="2400" b="0">
+                <a:latin typeface="Calibri"/>
+                <a:cs typeface="Calibri"/>
+              </a:rPr>
+              <a:t> it presents an opportunity to look into factors affecting credit accessibility</a:t>
+            </a:r>
+            <a:br>
+              <a:rPr lang="en-US" sz="2400" b="0">
+                <a:latin typeface="Calibri"/>
+                <a:cs typeface="Calibri"/>
+              </a:rPr>
+            </a:br>
+            <a:r>
+              <a:rPr lang="en-US" sz="2400" b="0">
+                <a:latin typeface="Calibri"/>
+                <a:cs typeface="Calibri"/>
+              </a:rPr>
+              <a:t>Our  Independent variable is: </a:t>
+            </a:r>
+            <a:r>
+              <a:rPr lang="en-GB" sz="2400" b="0">
+                <a:latin typeface="Calibri"/>
+                <a:cs typeface="Calibri"/>
+              </a:rPr>
+              <a:t>Personal income</a:t>
+            </a:r>
+            <a:br>
+              <a:rPr lang="en-US" sz="2400" b="0">
+                <a:latin typeface="Calibri"/>
+                <a:cs typeface="Calibri"/>
+              </a:rPr>
+            </a:br>
+            <a:r>
+              <a:rPr lang="en-US" sz="2400" b="0">
+                <a:solidFill>
+                  <a:srgbClr val="FF0000"/>
+                </a:solidFill>
+                <a:latin typeface="Calibri"/>
+                <a:cs typeface="Calibri"/>
+              </a:rPr>
+              <a:t>                   </a:t>
+            </a:r>
+            <a:r>
+              <a:rPr lang="en-US" sz="2400" b="0">
+                <a:latin typeface="Calibri"/>
+                <a:cs typeface="Calibri"/>
+              </a:rPr>
+              <a:t>This  Independent variable datatype is </a:t>
+            </a:r>
+            <a:r>
+              <a:rPr lang="en-US" sz="2400" b="0" i="0" u="none" strike="noStrike" cap="none" spc="-199">
+                <a:solidFill>
+                  <a:srgbClr val="FF0000"/>
+                </a:solidFill>
+                <a:latin typeface="Calibri"/>
+                <a:ea typeface="Calibri"/>
+                <a:cs typeface="Calibri"/>
+              </a:rPr>
+              <a:t>Interval</a:t>
+            </a:r>
+            <a:br>
+              <a:rPr lang="en-US" sz="2400" b="0">
+                <a:latin typeface="Calibri"/>
+                <a:cs typeface="Calibri"/>
+              </a:rPr>
+            </a:br>
+            <a:r>
+              <a:rPr lang="en-US" sz="2400" b="0">
+                <a:latin typeface="Calibri"/>
+                <a:cs typeface="Calibri"/>
+              </a:rPr>
+              <a:t>Our Dependent variable is: </a:t>
+            </a:r>
+            <a:r>
+              <a:rPr lang="en-GB" sz="2400" b="0">
+                <a:latin typeface="Calibri"/>
+                <a:cs typeface="Calibri"/>
+              </a:rPr>
+              <a:t>Loan amount</a:t>
+            </a:r>
+            <a:br>
+              <a:rPr lang="en-US" sz="2400" b="0">
+                <a:latin typeface="Calibri"/>
+                <a:cs typeface="Calibri"/>
+              </a:rPr>
+            </a:br>
+            <a:r>
+              <a:rPr lang="en-US" sz="2400" b="0">
+                <a:solidFill>
+                  <a:srgbClr val="FF0000"/>
+                </a:solidFill>
+                <a:latin typeface="Calibri"/>
+                <a:cs typeface="Calibri"/>
+              </a:rPr>
+              <a:t>                   </a:t>
+            </a:r>
+            <a:r>
+              <a:rPr lang="en-US" sz="2400" b="0">
+                <a:latin typeface="Calibri"/>
+                <a:cs typeface="Calibri"/>
+              </a:rPr>
+              <a:t>This Dependent variable datatype is  </a:t>
+            </a:r>
+            <a:r>
+              <a:rPr lang="en-US" sz="2400" b="0" i="0" u="none" strike="noStrike" cap="none" spc="-199">
+                <a:solidFill>
+                  <a:srgbClr val="FF0000"/>
+                </a:solidFill>
+                <a:latin typeface="Calibri"/>
+                <a:ea typeface="Calibri"/>
+                <a:cs typeface="Calibri"/>
+              </a:rPr>
+              <a:t>Interval</a:t>
+            </a:r>
+            <a:endParaRPr/>
+          </a:p>
+        </p:txBody>
+      </p:sp>
+      <p:sp>
+        <p:nvSpPr>
+          <p:cNvPr id="147630832" name="TextBox 5"/>
+          <p:cNvSpPr txBox="1"/>
+          <p:nvPr/>
+        </p:nvSpPr>
+        <p:spPr bwMode="auto">
+          <a:xfrm>
+            <a:off x="6766560" y="5385816"/>
+            <a:ext cx="4187952" cy="1200329"/>
+          </a:xfrm>
+          <a:prstGeom prst="rect">
+            <a:avLst/>
+          </a:prstGeom>
+          <a:noFill/>
+        </p:spPr>
+        <p:txBody>
+          <a:bodyPr wrap="square" rtlCol="0">
+            <a:spAutoFit/>
+          </a:bodyPr>
+          <a:lstStyle/>
+          <a:p>
+            <a:pPr>
+              <a:defRPr/>
+            </a:pPr>
+            <a:r>
+              <a:rPr lang="en-GB">
+                <a:solidFill>
+                  <a:schemeClr val="accent2">
+                    <a:lumMod val="75000"/>
+                  </a:schemeClr>
+                </a:solidFill>
+              </a:rPr>
+              <a:t>*For comparison of two nominal variables and for comparison of proportions you use two (or more) independent variables (see next slide)</a:t>
+            </a:r>
+            <a:endParaRPr/>
+          </a:p>
+        </p:txBody>
+      </p:sp>
+    </p:spTree>
+  </p:cSld>
+  <p:clrMapOvr>
+    <a:masterClrMapping/>
+  </p:clrMapOvr>
+  <mc:AlternateContent xmlns:mc="http://schemas.openxmlformats.org/markup-compatibility/2006">
+    <mc:Choice xmlns:p159="http://schemas.microsoft.com/office/powerpoint/2015/09/main" xmlns:p14="http://schemas.microsoft.com/office/powerpoint/2010/main" Requires="p159">
+      <p:transition p14:dur="2000" advClick="1"/>
+    </mc:Choice>
+    <mc:Fallback>
+      <p:transition advClick="1"/>
+    </mc:Fallback>
+  </mc:AlternateContent>
+</p:sld>
+</file>
+
 <file path=ppt/slides/slide4.xml><?xml version="1.0" encoding="utf-8"?>
 <p:sld xmlns:a="http://schemas.openxmlformats.org/drawingml/2006/main" xmlns:r="http://schemas.openxmlformats.org/officeDocument/2006/relationships" xmlns:p="http://schemas.openxmlformats.org/presentationml/2006/main" xmlns:m="http://schemas.openxmlformats.org/officeDocument/2006/math" xmlns:w="http://schemas.openxmlformats.org/wordprocessingml/2006/main" xmlns:mc="http://schemas.openxmlformats.org/markup-compatibility/2006" showMasterPhAnim="0" showMasterSp="1" show="1">
   <p:cSld name="">
@@ -5184,7 +5313,7 @@
       </p:grpSpPr>
       <p:sp>
         <p:nvSpPr>
-          <p:cNvPr id="1622891725" name="Subtitle 1"/>
+          <p:cNvPr id="1086058596" name="Subtitle 1"/>
           <p:cNvSpPr>
             <a:spLocks noGrp="1"/>
           </p:cNvSpPr>
@@ -5194,46 +5323,23 @@
         </p:nvSpPr>
         <p:spPr bwMode="auto">
           <a:xfrm>
-            <a:off x="965288" y="1285092"/>
-            <a:ext cx="10110240" cy="588024"/>
+            <a:off x="965289" y="1147638"/>
+            <a:ext cx="9753625" cy="230832"/>
           </a:xfrm>
         </p:spPr>
         <p:txBody>
-          <a:bodyPr vert="horz" lIns="0" tIns="0" rIns="0" bIns="0" rtlCol="0" anchor="t">
-            <a:noAutofit/>
-          </a:bodyPr>
+          <a:bodyPr/>
           <a:lstStyle/>
           <a:p>
             <a:pPr>
-              <a:defRPr/>
-            </a:pPr>
-            <a:r>
-              <a:rPr lang="en-US"/>
-              <a:t>Dataset </a:t>
-            </a:r>
-            <a:r>
-              <a:rPr lang="en-US">
-                <a:solidFill>
-                  <a:srgbClr val="203232"/>
-                </a:solidFill>
-              </a:rPr>
-              <a:t>ID</a:t>
-            </a:r>
-            <a:r>
-              <a:rPr lang="en-US" sz="1600">
-                <a:solidFill>
-                  <a:srgbClr val="FF0000"/>
-                </a:solidFill>
-              </a:rPr>
-              <a:t>:   </a:t>
-            </a:r>
-            <a:r>
-              <a:rPr lang="en-GB" sz="1600">
-                <a:solidFill>
-                  <a:srgbClr val="FF0000"/>
-                </a:solidFill>
-              </a:rPr>
-              <a:t>DS256- loan_Data.csv</a:t>
+              <a:spcAft>
+                <a:spcPts val="0"/>
+              </a:spcAft>
+              <a:defRPr/>
+            </a:pPr>
+            <a:r>
+              <a:rPr lang="en-GB"/>
+              <a:t>Our Research Question is </a:t>
             </a:r>
             <a:endParaRPr/>
           </a:p>
@@ -5241,48 +5347,43 @@
       </p:sp>
       <p:sp>
         <p:nvSpPr>
-          <p:cNvPr id="481224804" name="Footer Placeholder 2"/>
+          <p:cNvPr id="762571183" name="Footer Placeholder 2"/>
           <p:cNvSpPr>
             <a:spLocks noGrp="1"/>
           </p:cNvSpPr>
           <p:nvPr>
             <p:ph type="ftr" sz="quarter" idx="11"/>
+          </p:nvPr>
+        </p:nvSpPr>
+        <p:spPr bwMode="auto"/>
+        <p:txBody>
+          <a:bodyPr/>
+          <a:lstStyle/>
+          <a:p>
+            <a:pPr>
+              <a:defRPr/>
+            </a:pPr>
+            <a:r>
+              <a:rPr lang="en-GB"/>
+              <a:t>PRE 7COM1079-2025  Student Group No:  ?????</a:t>
+            </a:r>
+            <a:endParaRPr/>
+          </a:p>
+        </p:txBody>
+      </p:sp>
+      <p:sp>
+        <p:nvSpPr>
+          <p:cNvPr id="2028042218" name="Slide Number Placeholder 3"/>
+          <p:cNvSpPr>
+            <a:spLocks noGrp="1"/>
+          </p:cNvSpPr>
+          <p:nvPr>
+            <p:ph type="sldNum" sz="quarter" idx="12"/>
           </p:nvPr>
         </p:nvSpPr>
         <p:spPr bwMode="auto">
           <a:xfrm>
-            <a:off x="965288" y="791022"/>
-            <a:ext cx="9129687" cy="230832"/>
-          </a:xfrm>
-        </p:spPr>
-        <p:txBody>
-          <a:bodyPr/>
-          <a:lstStyle/>
-          <a:p>
-            <a:pPr>
-              <a:defRPr/>
-            </a:pPr>
-            <a:r>
-              <a:rPr lang="en-GB"/>
-              <a:t>7COM1079-2025  Student Group No:                    Names of Student Group Attendees: </a:t>
-            </a:r>
-            <a:endParaRPr/>
-          </a:p>
-        </p:txBody>
-      </p:sp>
-      <p:sp>
-        <p:nvSpPr>
-          <p:cNvPr id="903293932" name="Slide Number Placeholder 3"/>
-          <p:cNvSpPr>
-            <a:spLocks noGrp="1"/>
-          </p:cNvSpPr>
-          <p:nvPr>
-            <p:ph type="sldNum" sz="quarter" idx="12"/>
-          </p:nvPr>
-        </p:nvSpPr>
-        <p:spPr bwMode="auto">
-          <a:xfrm>
-            <a:off x="10954511" y="555565"/>
+            <a:off x="10616400" y="791022"/>
             <a:ext cx="622800" cy="230832"/>
           </a:xfrm>
         </p:spPr>
@@ -5295,7 +5396,7 @@
             </a:pPr>
             <a:r>
               <a:rPr lang="en-US"/>
-              <a:t>2</a:t>
+              <a:t>3</a:t>
             </a:r>
             <a:endParaRPr lang="en-GB"/>
           </a:p>
@@ -5303,7 +5404,7 @@
       </p:sp>
       <p:sp>
         <p:nvSpPr>
-          <p:cNvPr id="2028219079" name="Title 4"/>
+          <p:cNvPr id="255466634" name="Title 4"/>
           <p:cNvSpPr>
             <a:spLocks noGrp="1"/>
           </p:cNvSpPr>
@@ -5312,9 +5413,9 @@
           </p:nvPr>
         </p:nvSpPr>
         <p:spPr bwMode="auto">
-          <a:xfrm>
-            <a:off x="965288" y="1698305"/>
-            <a:ext cx="10974945" cy="2699181"/>
+          <a:xfrm flipH="0" flipV="0">
+            <a:off x="623944" y="1675917"/>
+            <a:ext cx="11040315" cy="3532689"/>
           </a:xfrm>
         </p:spPr>
         <p:txBody>
@@ -5330,175 +5431,270 @@
               <a:defRPr/>
             </a:pPr>
             <a:r>
-              <a:rPr lang="en-US" sz="2400" b="0">
+              <a:rPr lang="en-IE" sz="3000" b="0">
+                <a:latin typeface="Arial"/>
+                <a:ea typeface="Arial"/>
+                <a:cs typeface="Arial"/>
+              </a:rPr>
+              <a:t>Is there a correlation between </a:t>
+            </a:r>
+            <a:r>
+              <a:rPr lang="en-GB" sz="3000" b="0">
+                <a:latin typeface="Arial"/>
+                <a:ea typeface="Arial"/>
+                <a:cs typeface="Arial"/>
+              </a:rPr>
+              <a:t>loan amount </a:t>
+            </a:r>
+            <a:r>
+              <a:rPr lang="en-IE" sz="3000" b="0">
+                <a:latin typeface="Arial"/>
+                <a:ea typeface="Arial"/>
+                <a:cs typeface="Arial"/>
+              </a:rPr>
+              <a:t>and </a:t>
+            </a:r>
+            <a:r>
+              <a:rPr lang="en-GB" sz="3000" b="0">
+                <a:solidFill>
+                  <a:schemeClr val="tx1"/>
+                </a:solidFill>
+                <a:latin typeface="Arial"/>
+                <a:ea typeface="Arial"/>
+                <a:cs typeface="Arial"/>
+              </a:rPr>
+              <a:t>personal income for applicants</a:t>
+            </a:r>
+            <a:r>
+              <a:rPr lang="en-IE" sz="3000" b="0">
+                <a:solidFill>
+                  <a:schemeClr val="tx1"/>
+                </a:solidFill>
+                <a:latin typeface="Arial"/>
+                <a:ea typeface="Arial"/>
+                <a:cs typeface="Arial"/>
+              </a:rPr>
+              <a:t>?”</a:t>
+            </a:r>
+            <a:br>
+              <a:rPr lang="en-GB" sz="2800" b="0" i="0" u="none" strike="noStrike" cap="none" spc="-199">
+                <a:solidFill>
+                  <a:srgbClr val="FF0000"/>
+                </a:solidFill>
+                <a:latin typeface="Arial"/>
+                <a:ea typeface="Arial"/>
+                <a:cs typeface="Arial"/>
+              </a:rPr>
+            </a:br>
+            <a:br>
+              <a:rPr lang="en-GB" sz="2800" b="0" i="0" u="none" strike="noStrike" cap="none" spc="-199">
+                <a:solidFill>
+                  <a:srgbClr val="FF0000"/>
+                </a:solidFill>
+                <a:latin typeface="Arial"/>
+                <a:ea typeface="Arial"/>
+                <a:cs typeface="Arial"/>
+              </a:rPr>
+            </a:br>
+            <a:r>
+              <a:rPr lang="en-GB" sz="2800" b="0" i="0" u="none" strike="noStrike" cap="none" spc="-199">
+                <a:solidFill>
+                  <a:srgbClr val="FF0000"/>
+                </a:solidFill>
+                <a:latin typeface="Arial"/>
+                <a:ea typeface="Arial"/>
+                <a:cs typeface="Arial"/>
+              </a:rPr>
+              <a:t>Null hypothesis (H</a:t>
+            </a:r>
+            <a:r>
+              <a:rPr lang="en-GB" sz="2800" b="0" i="0" u="none" strike="noStrike" cap="none" spc="-199" baseline="-25000">
+                <a:solidFill>
+                  <a:srgbClr val="FF0000"/>
+                </a:solidFill>
+                <a:latin typeface="Arial"/>
+                <a:ea typeface="Arial"/>
+                <a:cs typeface="Arial"/>
+              </a:rPr>
+              <a:t>0</a:t>
+            </a:r>
+            <a:r>
+              <a:rPr lang="en-GB" sz="2800" b="0" i="0" u="none" strike="noStrike" cap="none" spc="-199">
+                <a:solidFill>
+                  <a:srgbClr val="FF0000"/>
+                </a:solidFill>
+                <a:latin typeface="Arial"/>
+                <a:ea typeface="Arial"/>
+                <a:cs typeface="Arial"/>
+              </a:rPr>
+              <a:t>): There is </a:t>
+            </a:r>
+            <a:r>
+              <a:rPr lang="en-GB" sz="2800" b="1" i="0" u="none" strike="noStrike" cap="none" spc="-199">
+                <a:solidFill>
+                  <a:srgbClr val="FF0000"/>
+                </a:solidFill>
+                <a:latin typeface="Arial"/>
+                <a:ea typeface="Arial"/>
+                <a:cs typeface="Arial"/>
+              </a:rPr>
+              <a:t>no</a:t>
+            </a:r>
+            <a:r>
+              <a:rPr lang="en-GB" sz="2800" b="0" i="0" u="none" strike="noStrike" cap="none" spc="-199">
+                <a:solidFill>
+                  <a:srgbClr val="FF0000"/>
+                </a:solidFill>
+                <a:latin typeface="Arial"/>
+                <a:ea typeface="Arial"/>
+                <a:cs typeface="Arial"/>
+              </a:rPr>
+              <a:t> correlation between loan amount and personal income of applicants.</a:t>
+            </a:r>
+            <a:br>
+              <a:rPr lang="en-GB" sz="2800" b="0" i="0" u="none" strike="noStrike" cap="none" spc="-199">
+                <a:solidFill>
+                  <a:srgbClr val="FF0000"/>
+                </a:solidFill>
+                <a:latin typeface="Arial"/>
+                <a:ea typeface="Arial"/>
+                <a:cs typeface="Arial"/>
+              </a:rPr>
+            </a:br>
+            <a:br>
+              <a:rPr lang="en-IE" sz="2800" b="0">
                 <a:latin typeface="Calibri"/>
-                <a:cs typeface="Calibri"/>
-              </a:rPr>
-              <a:t>This dataset is interesting to us because </a:t>
-            </a:r>
-            <a:r>
-              <a:rPr lang="en-US" sz="2400" b="0">
+                <a:ea typeface="Calibri"/>
+                <a:cs typeface="Times New Roman"/>
+              </a:rPr>
+            </a:br>
+            <a:r>
+              <a:rPr lang="en-GB" sz="2800" b="0" i="0" u="none" strike="noStrike" cap="none" spc="-199">
                 <a:solidFill>
                   <a:srgbClr val="FF0000"/>
                 </a:solidFill>
-                <a:latin typeface="Calibri"/>
-                <a:cs typeface="Calibri"/>
-              </a:rPr>
-              <a:t>(one sentence):</a:t>
-            </a:r>
-            <a:r>
-              <a:rPr lang="en-GB" sz="2400" b="0">
-                <a:latin typeface="Calibri"/>
-                <a:cs typeface="Calibri"/>
-              </a:rPr>
-              <a:t> it presents an opportunity to look into factors affecting credit accessibility</a:t>
-            </a:r>
-            <a:br>
-              <a:rPr lang="en-US" sz="2400" b="0">
-                <a:latin typeface="Calibri"/>
-                <a:cs typeface="Calibri"/>
-              </a:rPr>
-            </a:br>
-            <a:r>
-              <a:rPr lang="en-US" sz="2400" b="0" i="1">
-                <a:solidFill>
-                  <a:schemeClr val="accent2">
-                    <a:lumMod val="75000"/>
-                  </a:schemeClr>
-                </a:solidFill>
-                <a:latin typeface="Calibri"/>
-                <a:cs typeface="Calibri"/>
-              </a:rPr>
-              <a:t>From the column headings in your dataset choose ONE independent * and ONE dependent variable . </a:t>
-            </a:r>
-            <a:br>
-              <a:rPr lang="en-US" sz="2400" b="0">
-                <a:latin typeface="Calibri"/>
-                <a:cs typeface="Calibri"/>
-              </a:rPr>
-            </a:br>
-            <a:r>
-              <a:rPr lang="en-US" sz="2400" b="0">
-                <a:latin typeface="Calibri"/>
-                <a:cs typeface="Calibri"/>
-              </a:rPr>
-              <a:t>Our  Independent variable is: </a:t>
-            </a:r>
-            <a:r>
-              <a:rPr lang="en-GB" sz="2400" b="0">
-                <a:latin typeface="Calibri"/>
-                <a:cs typeface="Calibri"/>
-              </a:rPr>
-              <a:t>Person income</a:t>
-            </a:r>
-            <a:br>
-              <a:rPr lang="en-US" sz="2400" b="0">
-                <a:latin typeface="Calibri"/>
-                <a:cs typeface="Calibri"/>
-              </a:rPr>
-            </a:br>
-            <a:r>
-              <a:rPr lang="en-US" sz="2400" b="0">
+                <a:latin typeface="Arial"/>
+                <a:ea typeface="Arial"/>
+                <a:cs typeface="Arial"/>
+              </a:rPr>
+              <a:t>Alt hypothesis (H</a:t>
+            </a:r>
+            <a:r>
+              <a:rPr lang="en-GB" sz="2800" b="0" i="0" u="none" strike="noStrike" cap="none" spc="-199" baseline="-25000">
                 <a:solidFill>
                   <a:srgbClr val="FF0000"/>
                 </a:solidFill>
-                <a:latin typeface="Calibri"/>
-                <a:cs typeface="Calibri"/>
-              </a:rPr>
-              <a:t>                   </a:t>
-            </a:r>
-            <a:r>
-              <a:rPr lang="en-US" sz="2400" b="0">
-                <a:latin typeface="Calibri"/>
-                <a:cs typeface="Calibri"/>
-              </a:rPr>
-              <a:t>This  Independent variable datatype is (select one): </a:t>
-            </a:r>
-            <a:r>
-              <a:rPr lang="en-US" sz="2400" b="0">
+                <a:latin typeface="Arial"/>
+                <a:ea typeface="Arial"/>
+                <a:cs typeface="Arial"/>
+              </a:rPr>
+              <a:t>1</a:t>
+            </a:r>
+            <a:r>
+              <a:rPr lang="en-GB" sz="2800" b="0" i="0" u="none" strike="noStrike" cap="none" spc="-199">
                 <a:solidFill>
                   <a:srgbClr val="FF0000"/>
                 </a:solidFill>
-                <a:latin typeface="Calibri"/>
-                <a:cs typeface="Calibri"/>
-              </a:rPr>
-              <a:t>Interval/measurement data.</a:t>
-            </a:r>
-            <a:br>
-              <a:rPr lang="en-US" sz="2400" b="0">
-                <a:latin typeface="Calibri"/>
-                <a:cs typeface="Calibri"/>
-              </a:rPr>
-            </a:br>
-            <a:r>
-              <a:rPr lang="en-US" sz="2400" b="0">
-                <a:latin typeface="Calibri"/>
-                <a:cs typeface="Calibri"/>
-              </a:rPr>
-              <a:t>Our Dependent variable is: </a:t>
-            </a:r>
-            <a:r>
-              <a:rPr lang="en-GB" sz="2400" b="0">
-                <a:latin typeface="Calibri"/>
-                <a:cs typeface="Calibri"/>
-              </a:rPr>
-              <a:t>Loan amount</a:t>
-            </a:r>
-            <a:br>
-              <a:rPr lang="en-US" sz="2400" b="0">
-                <a:latin typeface="Calibri"/>
-                <a:cs typeface="Calibri"/>
-              </a:rPr>
-            </a:br>
-            <a:r>
-              <a:rPr lang="en-US" sz="2400" b="0">
+                <a:latin typeface="Arial"/>
+                <a:ea typeface="Arial"/>
+                <a:cs typeface="Arial"/>
+              </a:rPr>
+              <a:t>): There is </a:t>
+            </a:r>
+            <a:r>
+              <a:rPr lang="en-GB" sz="2800" b="1" i="0" u="none" strike="noStrike" cap="none" spc="-199">
                 <a:solidFill>
                   <a:srgbClr val="FF0000"/>
                 </a:solidFill>
-                <a:latin typeface="Calibri"/>
-                <a:cs typeface="Calibri"/>
-              </a:rPr>
-              <a:t>                   </a:t>
-            </a:r>
-            <a:r>
-              <a:rPr lang="en-US" sz="2400" b="0">
-                <a:latin typeface="Calibri"/>
-                <a:cs typeface="Calibri"/>
-              </a:rPr>
-              <a:t>This Dependent variable datatype is  (select one): </a:t>
-            </a:r>
-            <a:r>
-              <a:rPr lang="en-US" sz="2400" b="0">
+                <a:latin typeface="Arial"/>
+                <a:ea typeface="Arial"/>
+                <a:cs typeface="Arial"/>
+              </a:rPr>
+              <a:t>a</a:t>
+            </a:r>
+            <a:r>
+              <a:rPr lang="en-GB" sz="2800" b="0" i="0" u="none" strike="noStrike" cap="none" spc="-199">
                 <a:solidFill>
                   <a:srgbClr val="FF0000"/>
                 </a:solidFill>
-                <a:latin typeface="Calibri"/>
-                <a:cs typeface="Calibri"/>
-              </a:rPr>
-              <a:t>Interval/measurement data</a:t>
-            </a:r>
-            <a:endParaRPr/>
-          </a:p>
-        </p:txBody>
-      </p:sp>
-      <p:sp>
-        <p:nvSpPr>
-          <p:cNvPr id="30511241" name="TextBox 5"/>
+                <a:latin typeface="Arial"/>
+                <a:ea typeface="Arial"/>
+                <a:cs typeface="Arial"/>
+              </a:rPr>
+              <a:t> correlation between </a:t>
+            </a:r>
+            <a:r>
+              <a:rPr lang="en-GB" sz="2800" b="0" i="0" u="none" strike="noStrike" cap="none" spc="-99">
+                <a:solidFill>
+                  <a:srgbClr val="FF0000"/>
+                </a:solidFill>
+                <a:latin typeface="Arial"/>
+                <a:ea typeface="Arial"/>
+                <a:cs typeface="Arial"/>
+              </a:rPr>
+              <a:t>loan amount and personal income </a:t>
+            </a:r>
+            <a:r>
+              <a:rPr lang="en-GB" sz="2800" b="0" i="0" u="none" strike="noStrike" cap="none" spc="-99">
+                <a:solidFill>
+                  <a:srgbClr val="FF0000"/>
+                </a:solidFill>
+                <a:latin typeface="Arial"/>
+                <a:ea typeface="Arial"/>
+                <a:cs typeface="Arial"/>
+              </a:rPr>
+              <a:t>of applicants</a:t>
+            </a:r>
+            <a:r>
+              <a:rPr lang="en-GB" sz="2800" b="0" i="0" u="none" strike="noStrike" cap="none" spc="-199">
+                <a:solidFill>
+                  <a:srgbClr val="FF0000"/>
+                </a:solidFill>
+                <a:latin typeface="Arial"/>
+                <a:ea typeface="Arial"/>
+                <a:cs typeface="Arial"/>
+              </a:rPr>
+              <a:t>.</a:t>
+            </a:r>
+            <a:endParaRPr sz="2800"/>
+          </a:p>
+          <a:p>
+            <a:pPr>
+              <a:lnSpc>
+                <a:spcPct val="100000"/>
+              </a:lnSpc>
+              <a:defRPr/>
+            </a:pPr>
+            <a:endParaRPr sz="3600">
+              <a:solidFill>
+                <a:srgbClr val="FF0000"/>
+              </a:solidFill>
+            </a:endParaRPr>
+          </a:p>
+        </p:txBody>
+      </p:sp>
+      <p:sp>
+        <p:nvSpPr>
+          <p:cNvPr id="1950557582" name="TextBox 6"/>
           <p:cNvSpPr txBox="1"/>
           <p:nvPr/>
         </p:nvSpPr>
         <p:spPr bwMode="auto">
           <a:xfrm>
-            <a:off x="6766560" y="5385816"/>
-            <a:ext cx="4187952" cy="1200329"/>
+            <a:off x="623945" y="5297755"/>
+            <a:ext cx="11440040" cy="1477328"/>
           </a:xfrm>
           <a:prstGeom prst="rect">
             <a:avLst/>
           </a:prstGeom>
-          <a:noFill/>
+          <a:solidFill>
+            <a:schemeClr val="bg1">
+              <a:lumMod val="95000"/>
+            </a:schemeClr>
+          </a:solidFill>
         </p:spPr>
         <p:txBody>
-          <a:bodyPr wrap="square" rtlCol="0">
+          <a:bodyPr wrap="square" lIns="91440" tIns="45720" rIns="91440" bIns="45720" rtlCol="0" anchor="t">
             <a:spAutoFit/>
           </a:bodyPr>
           <a:lstStyle/>
@@ -5507,16 +5703,182 @@
               <a:defRPr/>
             </a:pPr>
             <a:r>
-              <a:rPr lang="en-GB">
-                <a:solidFill>
-                  <a:schemeClr val="accent2">
-                    <a:lumMod val="75000"/>
-                  </a:schemeClr>
-                </a:solidFill>
-              </a:rPr>
-              <a:t>*For comparison of two nominal variables and for comparison of proportions you use two (or more) independent variables (see next slide)</a:t>
+              <a:rPr lang="en-GB" baseline="30000"/>
+              <a:t>1</a:t>
+            </a:r>
+            <a:r>
+              <a:rPr lang="en-GB" b="1">
+                <a:latin typeface="Calibri"/>
+                <a:cs typeface="Calibri"/>
+              </a:rPr>
+              <a:t>Correlation</a:t>
+            </a:r>
+            <a:r>
+              <a:rPr lang="en-GB"/>
+              <a:t> (</a:t>
+            </a:r>
+            <a:r>
+              <a:rPr lang="en-IE" sz="1800">
+                <a:latin typeface="Calibri"/>
+                <a:ea typeface="Calibri"/>
+                <a:cs typeface="Times New Roman"/>
+              </a:rPr>
+              <a:t>Analysis of how </a:t>
+            </a:r>
+            <a:r>
+              <a:rPr lang="en-IE" sz="1800">
+                <a:solidFill>
+                  <a:srgbClr val="FF0000"/>
+                </a:solidFill>
+                <a:latin typeface="Calibri"/>
+                <a:ea typeface="Calibri"/>
+                <a:cs typeface="Times New Roman"/>
+              </a:rPr>
+              <a:t>ordinal</a:t>
+            </a:r>
+            <a:r>
+              <a:rPr lang="en-IE">
+                <a:solidFill>
+                  <a:srgbClr val="FF0000"/>
+                </a:solidFill>
+                <a:latin typeface="Calibri"/>
+                <a:ea typeface="Calibri"/>
+                <a:cs typeface="Times New Roman"/>
+              </a:rPr>
+              <a:t>/</a:t>
+            </a:r>
+            <a:r>
+              <a:rPr lang="en-IE" sz="1800">
+                <a:solidFill>
+                  <a:srgbClr val="FF0000"/>
+                </a:solidFill>
+                <a:latin typeface="Calibri"/>
+                <a:ea typeface="Calibri"/>
+                <a:cs typeface="Times New Roman"/>
+              </a:rPr>
+              <a:t>interval </a:t>
+            </a:r>
+            <a:r>
+              <a:rPr lang="en-IE" sz="1800">
+                <a:solidFill>
+                  <a:srgbClr val="00B050"/>
+                </a:solidFill>
+                <a:latin typeface="Calibri"/>
+                <a:ea typeface="Calibri"/>
+                <a:cs typeface="Times New Roman"/>
+              </a:rPr>
+              <a:t>dependent var</a:t>
+            </a:r>
+            <a:r>
+              <a:rPr lang="en-IE" sz="1800">
+                <a:latin typeface="Calibri"/>
+                <a:ea typeface="Calibri"/>
+                <a:cs typeface="Times New Roman"/>
+              </a:rPr>
+              <a:t> </a:t>
+            </a:r>
+            <a:r>
+              <a:rPr lang="en-IE">
+                <a:latin typeface="Calibri"/>
+                <a:ea typeface="Calibri"/>
+                <a:cs typeface="Times New Roman"/>
+              </a:rPr>
+              <a:t>correlates </a:t>
+            </a:r>
+            <a:r>
+              <a:rPr lang="en-IE" sz="1800">
+                <a:latin typeface="Calibri"/>
+                <a:ea typeface="Calibri"/>
+                <a:cs typeface="Times New Roman"/>
+              </a:rPr>
+              <a:t>to an </a:t>
+            </a:r>
+            <a:r>
+              <a:rPr lang="en-IE" sz="1800">
+                <a:solidFill>
+                  <a:srgbClr val="FF0000"/>
+                </a:solidFill>
+                <a:latin typeface="Calibri"/>
+                <a:ea typeface="Calibri"/>
+                <a:cs typeface="Times New Roman"/>
+              </a:rPr>
+              <a:t>ordinal/interval </a:t>
+            </a:r>
+            <a:r>
+              <a:rPr lang="en-IE" sz="1800">
+                <a:solidFill>
+                  <a:srgbClr val="00B050"/>
+                </a:solidFill>
+                <a:latin typeface="Calibri"/>
+                <a:ea typeface="Calibri"/>
+                <a:cs typeface="Times New Roman"/>
+              </a:rPr>
+              <a:t>independent variable)</a:t>
+            </a:r>
+            <a:endParaRPr lang="en-GB">
+              <a:latin typeface="Calibri"/>
+              <a:cs typeface="Times New Roman"/>
+            </a:endParaRPr>
+          </a:p>
+          <a:p>
+            <a:pPr>
+              <a:defRPr/>
+            </a:pPr>
+            <a:r>
+              <a:rPr lang="en-IE" sz="1800" b="1" baseline="30000">
+                <a:latin typeface="Calibri"/>
+                <a:ea typeface="Calibri"/>
+                <a:cs typeface="Times New Roman"/>
+              </a:rPr>
+              <a:t>2</a:t>
+            </a:r>
+            <a:r>
+              <a:rPr lang="en-IE" sz="1800" b="1">
+                <a:latin typeface="Calibri"/>
+                <a:ea typeface="Calibri"/>
+                <a:cs typeface="Times New Roman"/>
+              </a:rPr>
+              <a:t>Comparison of means</a:t>
+            </a:r>
+            <a:r>
+              <a:rPr lang="en-IE" sz="1800">
+                <a:latin typeface="Calibri"/>
+                <a:ea typeface="Calibri"/>
+                <a:cs typeface="Times New Roman"/>
+              </a:rPr>
+              <a:t> (or medians): Analysis of the difference between the mean (or median) value of a characteristic shared by members of two different populations.</a:t>
             </a:r>
             <a:endParaRPr/>
+          </a:p>
+          <a:p>
+            <a:pPr>
+              <a:defRPr/>
+            </a:pPr>
+            <a:r>
+              <a:rPr lang="en-IE" sz="1800" b="1" baseline="30000">
+                <a:latin typeface="Calibri"/>
+                <a:ea typeface="Calibri"/>
+                <a:cs typeface="Times New Roman"/>
+              </a:rPr>
+              <a:t>3</a:t>
+            </a:r>
+            <a:r>
+              <a:rPr lang="en-IE" sz="1800" b="1">
+                <a:latin typeface="Calibri"/>
+                <a:ea typeface="Calibri"/>
+                <a:cs typeface="Times New Roman"/>
+              </a:rPr>
+              <a:t>Comparison of proportions:</a:t>
+            </a:r>
+            <a:r>
+              <a:rPr lang="en-IE" sz="1800">
+                <a:latin typeface="Calibri"/>
+                <a:ea typeface="Calibri"/>
+                <a:cs typeface="Times New Roman"/>
+              </a:rPr>
+              <a:t> Analysis of the difference in proportions of a characteristic shared by members of two different populations. </a:t>
+            </a:r>
+            <a:endParaRPr lang="en-GB"/>
           </a:p>
         </p:txBody>
       </p:sp>
@@ -5555,430 +5917,7 @@
       </p:grpSpPr>
       <p:sp>
         <p:nvSpPr>
-          <p:cNvPr id="1864758753" name="Subtitle 1"/>
-          <p:cNvSpPr>
-            <a:spLocks noGrp="1"/>
-          </p:cNvSpPr>
-          <p:nvPr>
-            <p:ph type="subTitle" idx="1"/>
-          </p:nvPr>
-        </p:nvSpPr>
-        <p:spPr bwMode="auto">
-          <a:xfrm>
-            <a:off x="965289" y="1147638"/>
-            <a:ext cx="9753625" cy="230832"/>
-          </a:xfrm>
-        </p:spPr>
-        <p:txBody>
-          <a:bodyPr/>
-          <a:lstStyle/>
-          <a:p>
-            <a:pPr>
-              <a:spcAft>
-                <a:spcPts val="0"/>
-              </a:spcAft>
-              <a:defRPr/>
-            </a:pPr>
-            <a:r>
-              <a:rPr lang="en-GB"/>
-              <a:t>Our Research Question is </a:t>
-            </a:r>
-            <a:endParaRPr/>
-          </a:p>
-        </p:txBody>
-      </p:sp>
-      <p:sp>
-        <p:nvSpPr>
-          <p:cNvPr id="747391174" name="Footer Placeholder 2"/>
-          <p:cNvSpPr>
-            <a:spLocks noGrp="1"/>
-          </p:cNvSpPr>
-          <p:nvPr>
-            <p:ph type="ftr" sz="quarter" idx="11"/>
-          </p:nvPr>
-        </p:nvSpPr>
-        <p:spPr bwMode="auto"/>
-        <p:txBody>
-          <a:bodyPr/>
-          <a:lstStyle/>
-          <a:p>
-            <a:pPr>
-              <a:defRPr/>
-            </a:pPr>
-            <a:r>
-              <a:rPr lang="en-GB"/>
-              <a:t>PRE 7COM1079-2025  Student Group No:  ?????</a:t>
-            </a:r>
-            <a:endParaRPr/>
-          </a:p>
-        </p:txBody>
-      </p:sp>
-      <p:sp>
-        <p:nvSpPr>
-          <p:cNvPr id="1399904855" name="Slide Number Placeholder 3"/>
-          <p:cNvSpPr>
-            <a:spLocks noGrp="1"/>
-          </p:cNvSpPr>
-          <p:nvPr>
-            <p:ph type="sldNum" sz="quarter" idx="12"/>
-          </p:nvPr>
-        </p:nvSpPr>
-        <p:spPr bwMode="auto">
-          <a:xfrm>
-            <a:off x="10616400" y="791022"/>
-            <a:ext cx="622800" cy="230832"/>
-          </a:xfrm>
-        </p:spPr>
-        <p:txBody>
-          <a:bodyPr/>
-          <a:lstStyle/>
-          <a:p>
-            <a:pPr>
-              <a:defRPr/>
-            </a:pPr>
-            <a:r>
-              <a:rPr lang="en-US"/>
-              <a:t>3</a:t>
-            </a:r>
-            <a:endParaRPr lang="en-GB"/>
-          </a:p>
-        </p:txBody>
-      </p:sp>
-      <p:sp>
-        <p:nvSpPr>
-          <p:cNvPr id="1526040471" name="Title 4"/>
-          <p:cNvSpPr>
-            <a:spLocks noGrp="1"/>
-          </p:cNvSpPr>
-          <p:nvPr>
-            <p:ph type="ctrTitle"/>
-          </p:nvPr>
-        </p:nvSpPr>
-        <p:spPr bwMode="auto">
-          <a:xfrm>
-            <a:off x="1023667" y="1893913"/>
-            <a:ext cx="10640594" cy="2678085"/>
-          </a:xfrm>
-        </p:spPr>
-        <p:txBody>
-          <a:bodyPr>
-            <a:noAutofit/>
-          </a:bodyPr>
-          <a:lstStyle/>
-          <a:p>
-            <a:pPr>
-              <a:lnSpc>
-                <a:spcPct val="100000"/>
-              </a:lnSpc>
-              <a:defRPr/>
-            </a:pPr>
-            <a:r>
-              <a:rPr lang="en-IE" sz="2400" b="0">
-                <a:latin typeface="Calibri"/>
-                <a:ea typeface="Calibri"/>
-                <a:cs typeface="Times New Roman"/>
-              </a:rPr>
-              <a:t>Is there a correlation between </a:t>
-            </a:r>
-            <a:r>
-              <a:rPr lang="en-GB" sz="2400" b="0">
-                <a:latin typeface="Calibri"/>
-                <a:ea typeface="Calibri"/>
-                <a:cs typeface="Times New Roman"/>
-              </a:rPr>
-              <a:t>loan amount </a:t>
-            </a:r>
-            <a:r>
-              <a:rPr lang="en-IE" sz="2400" b="0">
-                <a:latin typeface="Calibri"/>
-                <a:ea typeface="Calibri"/>
-                <a:cs typeface="Times New Roman"/>
-              </a:rPr>
-              <a:t>and </a:t>
-            </a:r>
-            <a:r>
-              <a:rPr lang="en-GB" sz="2400" b="0">
-                <a:solidFill>
-                  <a:srgbClr val="0070C0"/>
-                </a:solidFill>
-                <a:latin typeface="Calibri"/>
-                <a:ea typeface="Calibri"/>
-                <a:cs typeface="Times New Roman"/>
-              </a:rPr>
-              <a:t>personal income for people</a:t>
-            </a:r>
-            <a:r>
-              <a:rPr lang="en-IE" sz="2400" b="0">
-                <a:solidFill>
-                  <a:srgbClr val="0070C0"/>
-                </a:solidFill>
-                <a:latin typeface="Calibri"/>
-                <a:ea typeface="Calibri"/>
-                <a:cs typeface="Times New Roman"/>
-              </a:rPr>
-              <a:t>?”</a:t>
-            </a:r>
-            <a:r>
-              <a:rPr lang="en-IE" sz="2400" b="0">
-                <a:latin typeface="Calibri"/>
-                <a:ea typeface="Calibri"/>
-                <a:cs typeface="Times New Roman"/>
-              </a:rPr>
-              <a:t>. </a:t>
-            </a:r>
-            <a:endParaRPr lang="en-GB" sz="2400">
-              <a:solidFill>
-                <a:srgbClr val="FF0000"/>
-              </a:solidFill>
-            </a:endParaRPr>
-          </a:p>
-        </p:txBody>
-      </p:sp>
-      <p:sp>
-        <p:nvSpPr>
-          <p:cNvPr id="71936989" name="TextBox 6"/>
-          <p:cNvSpPr txBox="1"/>
-          <p:nvPr/>
-        </p:nvSpPr>
-        <p:spPr bwMode="auto">
-          <a:xfrm>
-            <a:off x="623945" y="5297755"/>
-            <a:ext cx="11440040" cy="1477328"/>
-          </a:xfrm>
-          <a:prstGeom prst="rect">
-            <a:avLst/>
-          </a:prstGeom>
-          <a:solidFill>
-            <a:schemeClr val="bg1">
-              <a:lumMod val="95000"/>
-            </a:schemeClr>
-          </a:solidFill>
-        </p:spPr>
-        <p:txBody>
-          <a:bodyPr wrap="square" lIns="91440" tIns="45720" rIns="91440" bIns="45720" rtlCol="0" anchor="t">
-            <a:spAutoFit/>
-          </a:bodyPr>
-          <a:lstStyle/>
-          <a:p>
-            <a:pPr>
-              <a:defRPr/>
-            </a:pPr>
-            <a:r>
-              <a:rPr lang="en-GB" baseline="30000"/>
-              <a:t>1</a:t>
-            </a:r>
-            <a:r>
-              <a:rPr lang="en-GB" b="1">
-                <a:latin typeface="Calibri"/>
-                <a:cs typeface="Calibri"/>
-              </a:rPr>
-              <a:t>Correlation</a:t>
-            </a:r>
-            <a:r>
-              <a:rPr lang="en-GB"/>
-              <a:t> (</a:t>
-            </a:r>
-            <a:r>
-              <a:rPr lang="en-IE" sz="1800">
-                <a:latin typeface="Calibri"/>
-                <a:ea typeface="Calibri"/>
-                <a:cs typeface="Times New Roman"/>
-              </a:rPr>
-              <a:t>Analysis of how </a:t>
-            </a:r>
-            <a:r>
-              <a:rPr lang="en-IE" sz="1800">
-                <a:solidFill>
-                  <a:srgbClr val="FF0000"/>
-                </a:solidFill>
-                <a:latin typeface="Calibri"/>
-                <a:ea typeface="Calibri"/>
-                <a:cs typeface="Times New Roman"/>
-              </a:rPr>
-              <a:t>ordinal</a:t>
-            </a:r>
-            <a:r>
-              <a:rPr lang="en-IE">
-                <a:solidFill>
-                  <a:srgbClr val="FF0000"/>
-                </a:solidFill>
-                <a:latin typeface="Calibri"/>
-                <a:ea typeface="Calibri"/>
-                <a:cs typeface="Times New Roman"/>
-              </a:rPr>
-              <a:t>/</a:t>
-            </a:r>
-            <a:r>
-              <a:rPr lang="en-IE" sz="1800">
-                <a:solidFill>
-                  <a:srgbClr val="FF0000"/>
-                </a:solidFill>
-                <a:latin typeface="Calibri"/>
-                <a:ea typeface="Calibri"/>
-                <a:cs typeface="Times New Roman"/>
-              </a:rPr>
-              <a:t>interval </a:t>
-            </a:r>
-            <a:r>
-              <a:rPr lang="en-IE" sz="1800">
-                <a:solidFill>
-                  <a:srgbClr val="00B050"/>
-                </a:solidFill>
-                <a:latin typeface="Calibri"/>
-                <a:ea typeface="Calibri"/>
-                <a:cs typeface="Times New Roman"/>
-              </a:rPr>
-              <a:t>dependent var</a:t>
-            </a:r>
-            <a:r>
-              <a:rPr lang="en-IE" sz="1800">
-                <a:latin typeface="Calibri"/>
-                <a:ea typeface="Calibri"/>
-                <a:cs typeface="Times New Roman"/>
-              </a:rPr>
-              <a:t> </a:t>
-            </a:r>
-            <a:r>
-              <a:rPr lang="en-IE">
-                <a:latin typeface="Calibri"/>
-                <a:ea typeface="Calibri"/>
-                <a:cs typeface="Times New Roman"/>
-              </a:rPr>
-              <a:t>correlates </a:t>
-            </a:r>
-            <a:r>
-              <a:rPr lang="en-IE" sz="1800">
-                <a:latin typeface="Calibri"/>
-                <a:ea typeface="Calibri"/>
-                <a:cs typeface="Times New Roman"/>
-              </a:rPr>
-              <a:t>to an </a:t>
-            </a:r>
-            <a:r>
-              <a:rPr lang="en-IE" sz="1800">
-                <a:solidFill>
-                  <a:srgbClr val="FF0000"/>
-                </a:solidFill>
-                <a:latin typeface="Calibri"/>
-                <a:ea typeface="Calibri"/>
-                <a:cs typeface="Times New Roman"/>
-              </a:rPr>
-              <a:t>ordinal/interval </a:t>
-            </a:r>
-            <a:r>
-              <a:rPr lang="en-IE" sz="1800">
-                <a:solidFill>
-                  <a:srgbClr val="00B050"/>
-                </a:solidFill>
-                <a:latin typeface="Calibri"/>
-                <a:ea typeface="Calibri"/>
-                <a:cs typeface="Times New Roman"/>
-              </a:rPr>
-              <a:t>independent variable)</a:t>
-            </a:r>
-            <a:endParaRPr lang="en-GB">
-              <a:latin typeface="Calibri"/>
-              <a:cs typeface="Times New Roman"/>
-            </a:endParaRPr>
-          </a:p>
-          <a:p>
-            <a:pPr>
-              <a:defRPr/>
-            </a:pPr>
-            <a:r>
-              <a:rPr lang="en-IE" sz="1800" b="1" baseline="30000">
-                <a:latin typeface="Calibri"/>
-                <a:ea typeface="Calibri"/>
-                <a:cs typeface="Times New Roman"/>
-              </a:rPr>
-              <a:t>2</a:t>
-            </a:r>
-            <a:r>
-              <a:rPr lang="en-IE" sz="1800" b="1">
-                <a:latin typeface="Calibri"/>
-                <a:ea typeface="Calibri"/>
-                <a:cs typeface="Times New Roman"/>
-              </a:rPr>
-              <a:t>Comparison of means</a:t>
-            </a:r>
-            <a:r>
-              <a:rPr lang="en-IE" sz="1800">
-                <a:latin typeface="Calibri"/>
-                <a:ea typeface="Calibri"/>
-                <a:cs typeface="Times New Roman"/>
-              </a:rPr>
-              <a:t> (or medians): Analysis of the difference between the mean (or median) value of a characteristic shared by members of two different populations.</a:t>
-            </a:r>
-            <a:endParaRPr/>
-          </a:p>
-          <a:p>
-            <a:pPr>
-              <a:defRPr/>
-            </a:pPr>
-            <a:r>
-              <a:rPr lang="en-IE" sz="1800" b="1" baseline="30000">
-                <a:latin typeface="Calibri"/>
-                <a:ea typeface="Calibri"/>
-                <a:cs typeface="Times New Roman"/>
-              </a:rPr>
-              <a:t>3</a:t>
-            </a:r>
-            <a:r>
-              <a:rPr lang="en-IE" sz="1800" b="1">
-                <a:latin typeface="Calibri"/>
-                <a:ea typeface="Calibri"/>
-                <a:cs typeface="Times New Roman"/>
-              </a:rPr>
-              <a:t>Comparison of proportions:</a:t>
-            </a:r>
-            <a:r>
-              <a:rPr lang="en-IE" sz="1800">
-                <a:latin typeface="Calibri"/>
-                <a:ea typeface="Calibri"/>
-                <a:cs typeface="Times New Roman"/>
-              </a:rPr>
-              <a:t> Analysis of the difference in proportions of a characteristic shared by members of two different populations. </a:t>
-            </a:r>
-            <a:endParaRPr lang="en-GB"/>
-          </a:p>
-        </p:txBody>
-      </p:sp>
-    </p:spTree>
-  </p:cSld>
-  <p:clrMapOvr>
-    <a:masterClrMapping/>
-  </p:clrMapOvr>
-  <mc:AlternateContent xmlns:mc="http://schemas.openxmlformats.org/markup-compatibility/2006">
-    <mc:Choice xmlns:p159="http://schemas.microsoft.com/office/powerpoint/2015/09/main" xmlns:p14="http://schemas.microsoft.com/office/powerpoint/2010/main" Requires="p159">
-      <p:transition p14:dur="2000" advClick="1"/>
-    </mc:Choice>
-    <mc:Fallback>
-      <p:transition advClick="1"/>
-    </mc:Fallback>
-  </mc:AlternateContent>
-</p:sld>
-</file>
-
-<file path=ppt/slides/slide6.xml><?xml version="1.0" encoding="utf-8"?>
-<p:sld xmlns:a="http://schemas.openxmlformats.org/drawingml/2006/main" xmlns:r="http://schemas.openxmlformats.org/officeDocument/2006/relationships" xmlns:p="http://schemas.openxmlformats.org/presentationml/2006/main" xmlns:m="http://schemas.openxmlformats.org/officeDocument/2006/math" xmlns:w="http://schemas.openxmlformats.org/wordprocessingml/2006/main" xmlns:mc="http://schemas.openxmlformats.org/markup-compatibility/2006" showMasterPhAnim="0" showMasterSp="1" show="1">
-  <p:cSld name="">
-    <p:spTree>
-      <p:nvGrpSpPr>
-        <p:cNvPr id="1" name=""/>
-        <p:cNvGrpSpPr/>
-        <p:nvPr/>
-      </p:nvGrpSpPr>
-      <p:grpSpPr bwMode="auto">
-        <a:xfrm>
-          <a:off x="0" y="0"/>
-          <a:ext cx="0" cy="0"/>
-          <a:chOff x="0" y="0"/>
-          <a:chExt cx="0" cy="0"/>
-        </a:xfrm>
-      </p:grpSpPr>
-      <p:sp>
-        <p:nvSpPr>
-          <p:cNvPr id="1132906090" name="Subtitle 1"/>
+          <p:cNvPr id="2126416149" name="Subtitle 1"/>
           <p:cNvSpPr>
             <a:spLocks noGrp="1"/>
           </p:cNvSpPr>
@@ -6305,7 +6244,7 @@
       </p:sp>
       <p:sp>
         <p:nvSpPr>
-          <p:cNvPr id="1223118450" name="Slide Number Placeholder 3"/>
+          <p:cNvPr id="383389901" name="Slide Number Placeholder 3"/>
           <p:cNvSpPr>
             <a:spLocks noGrp="1"/>
           </p:cNvSpPr>
@@ -6336,7 +6275,7 @@
       </p:sp>
       <p:sp>
         <p:nvSpPr>
-          <p:cNvPr id="1989050872" name="TextBox 5"/>
+          <p:cNvPr id="1720348779" name="TextBox 5"/>
           <p:cNvSpPr txBox="1"/>
           <p:nvPr/>
         </p:nvSpPr>

</xml_diff>